<commit_message>
finish the slides: submitting a slurm script, overview of an HPC workflow, and further help, and generate a pdf
</commit_message>
<xml_diff>
--- a/CU_presentation/CU_boulder_presentation.pptx
+++ b/CU_presentation/CU_boulder_presentation.pptx
@@ -4294,19 +4294,27 @@
         </p:nvSpPr>
         <p:spPr>
           <a:xfrm>
-            <a:off x="599221" y="1370234"/>
-            <a:ext cx="10993549" cy="811174"/>
+            <a:off x="599221" y="822036"/>
+            <a:ext cx="10993549" cy="1359372"/>
           </a:xfrm>
         </p:spPr>
         <p:txBody>
           <a:bodyPr anchor="t">
-            <a:normAutofit/>
+            <a:normAutofit fontScale="90000"/>
           </a:bodyPr>
           <a:lstStyle/>
           <a:p>
-            <a:r>
-              <a:rPr lang="en-US" sz="4400" dirty="0"/>
-              <a:t>HPC Crash Course</a:t>
+            <a:pPr algn="ctr"/>
+            <a:r>
+              <a:rPr lang="en-US" sz="4400" cap="none" dirty="0"/>
+              <a:t>High Performance Computing (HPC) </a:t>
+            </a:r>
+            <a:br>
+              <a:rPr lang="en-US" sz="4400" cap="none" dirty="0"/>
+            </a:br>
+            <a:r>
+              <a:rPr lang="en-US" sz="4400" cap="none" dirty="0"/>
+              <a:t>Crash Course</a:t>
             </a:r>
           </a:p>
         </p:txBody>
@@ -4764,6 +4772,7 @@
             <a:solidFill>
               <a:schemeClr val="accent2"/>
             </a:solidFill>
+            <a:ln w="25400"/>
           </p:spPr>
           <p:style>
             <a:lnRef idx="2">
@@ -5312,10 +5321,9 @@
           <a:lstStyle/>
           <a:p>
             <a:r>
-              <a:rPr lang="en-US"/>
+              <a:rPr lang="en-US" dirty="0"/>
               <a:t>rc-help@colorado.edu</a:t>
             </a:r>
-            <a:endParaRPr lang="en-US" dirty="0"/>
           </a:p>
         </p:txBody>
       </p:sp>
@@ -5807,6 +5815,56 @@
           </a:p>
         </p:txBody>
       </p:sp>
+      <p:sp>
+        <p:nvSpPr>
+          <p:cNvPr id="21" name="Right Arrow 20">
+            <a:extLst>
+              <a:ext uri="{FF2B5EF4-FFF2-40B4-BE49-F238E27FC236}">
+                <a16:creationId xmlns:a16="http://schemas.microsoft.com/office/drawing/2014/main" id="{A85DDC2E-C8DA-C443-8C95-BB96FB39ADB3}"/>
+              </a:ext>
+            </a:extLst>
+          </p:cNvPr>
+          <p:cNvSpPr/>
+          <p:nvPr/>
+        </p:nvSpPr>
+        <p:spPr>
+          <a:xfrm>
+            <a:off x="5326368" y="4076285"/>
+            <a:ext cx="951345" cy="297763"/>
+          </a:xfrm>
+          <a:prstGeom prst="rightArrow">
+            <a:avLst/>
+          </a:prstGeom>
+          <a:solidFill>
+            <a:schemeClr val="tx1"/>
+          </a:solidFill>
+          <a:ln w="28575"/>
+        </p:spPr>
+        <p:style>
+          <a:lnRef idx="2">
+            <a:schemeClr val="accent1">
+              <a:shade val="50000"/>
+            </a:schemeClr>
+          </a:lnRef>
+          <a:fillRef idx="1">
+            <a:schemeClr val="accent1"/>
+          </a:fillRef>
+          <a:effectRef idx="0">
+            <a:schemeClr val="accent1"/>
+          </a:effectRef>
+          <a:fontRef idx="minor">
+            <a:schemeClr val="lt1"/>
+          </a:fontRef>
+        </p:style>
+        <p:txBody>
+          <a:bodyPr rtlCol="0" anchor="ctr"/>
+          <a:lstStyle/>
+          <a:p>
+            <a:pPr algn="ctr"/>
+            <a:endParaRPr lang="en-US" dirty="0"/>
+          </a:p>
+        </p:txBody>
+      </p:sp>
     </p:spTree>
     <p:extLst>
       <p:ext uri="{BB962C8B-B14F-4D97-AF65-F5344CB8AC3E}">
@@ -5887,10 +5945,9 @@
           <a:lstStyle/>
           <a:p>
             <a:r>
-              <a:rPr lang="en-US"/>
+              <a:rPr lang="en-US" dirty="0"/>
               <a:t>rc-help@colorado.edu</a:t>
             </a:r>
-            <a:endParaRPr lang="en-US" dirty="0"/>
           </a:p>
         </p:txBody>
       </p:sp>
@@ -5908,7 +5965,7 @@
         </p:nvGrpSpPr>
         <p:grpSpPr>
           <a:xfrm>
-            <a:off x="719737" y="2323222"/>
+            <a:off x="476699" y="2358565"/>
             <a:ext cx="2605355" cy="1105778"/>
             <a:chOff x="483796" y="3429000"/>
             <a:chExt cx="3146096" cy="1080654"/>
@@ -5961,7 +6018,7 @@
             <a:lstStyle/>
             <a:p>
               <a:pPr algn="ctr"/>
-              <a:endParaRPr lang="en-US"/>
+              <a:endParaRPr lang="en-US" dirty="0"/>
             </a:p>
           </p:txBody>
         </p:sp>
@@ -6026,8 +6083,8 @@
         </p:nvSpPr>
         <p:spPr>
           <a:xfrm>
-            <a:off x="4539670" y="2558700"/>
-            <a:ext cx="3736112" cy="648440"/>
+            <a:off x="4027400" y="2534729"/>
+            <a:ext cx="2710875" cy="648440"/>
           </a:xfrm>
           <a:prstGeom prst="rect">
             <a:avLst/>
@@ -6072,48 +6129,6 @@
               <a:t>$ module load slurm/alpine</a:t>
             </a:r>
           </a:p>
-          <a:p>
-            <a:r>
-              <a:rPr lang="en-US" dirty="0">
-                <a:solidFill>
-                  <a:schemeClr val="tx1"/>
-                </a:solidFill>
-              </a:rPr>
-              <a:t>$ </a:t>
-            </a:r>
-            <a:r>
-              <a:rPr lang="en-US" dirty="0" err="1">
-                <a:solidFill>
-                  <a:schemeClr val="tx1"/>
-                </a:solidFill>
-              </a:rPr>
-              <a:t>acompile</a:t>
-            </a:r>
-            <a:r>
-              <a:rPr lang="en-US" dirty="0">
-                <a:solidFill>
-                  <a:schemeClr val="tx1"/>
-                </a:solidFill>
-              </a:rPr>
-              <a:t> –</a:t>
-            </a:r>
-            <a:r>
-              <a:rPr lang="en-US" dirty="0" err="1">
-                <a:solidFill>
-                  <a:schemeClr val="tx1"/>
-                </a:solidFill>
-              </a:rPr>
-              <a:t>ntasks</a:t>
-            </a:r>
-            <a:r>
-              <a:rPr lang="en-US" dirty="0">
-                <a:solidFill>
-                  <a:schemeClr val="tx1"/>
-                </a:solidFill>
-              </a:rPr>
-              <a:t>=2 –time=01:00:00</a:t>
-            </a:r>
-          </a:p>
         </p:txBody>
       </p:sp>
       <p:sp>
@@ -6130,7 +6145,7 @@
         </p:nvSpPr>
         <p:spPr>
           <a:xfrm>
-            <a:off x="733595" y="4944832"/>
+            <a:off x="1786305" y="5110249"/>
             <a:ext cx="2591497" cy="394426"/>
           </a:xfrm>
           <a:prstGeom prst="rect">
@@ -6178,6 +6193,648 @@
           </a:p>
         </p:txBody>
       </p:sp>
+      <p:cxnSp>
+        <p:nvCxnSpPr>
+          <p:cNvPr id="12" name="Straight Arrow Connector 11">
+            <a:extLst>
+              <a:ext uri="{FF2B5EF4-FFF2-40B4-BE49-F238E27FC236}">
+                <a16:creationId xmlns:a16="http://schemas.microsoft.com/office/drawing/2014/main" id="{0119D542-AB6C-8940-96BC-17DE53A30902}"/>
+              </a:ext>
+            </a:extLst>
+          </p:cNvPr>
+          <p:cNvCxnSpPr>
+            <a:cxnSpLocks/>
+            <a:stCxn id="6" idx="3"/>
+            <a:endCxn id="7" idx="1"/>
+          </p:cNvCxnSpPr>
+          <p:nvPr/>
+        </p:nvCxnSpPr>
+        <p:spPr>
+          <a:xfrm flipV="1">
+            <a:off x="3069658" y="2858949"/>
+            <a:ext cx="957742" cy="8005"/>
+          </a:xfrm>
+          <a:prstGeom prst="straightConnector1">
+            <a:avLst/>
+          </a:prstGeom>
+          <a:ln w="38100">
+            <a:solidFill>
+              <a:schemeClr val="tx1"/>
+            </a:solidFill>
+            <a:tailEnd type="triangle"/>
+          </a:ln>
+        </p:spPr>
+        <p:style>
+          <a:lnRef idx="1">
+            <a:schemeClr val="accent1"/>
+          </a:lnRef>
+          <a:fillRef idx="0">
+            <a:schemeClr val="accent1"/>
+          </a:fillRef>
+          <a:effectRef idx="0">
+            <a:schemeClr val="accent1"/>
+          </a:effectRef>
+          <a:fontRef idx="minor">
+            <a:schemeClr val="tx1"/>
+          </a:fontRef>
+        </p:style>
+      </p:cxnSp>
+      <p:grpSp>
+        <p:nvGrpSpPr>
+          <p:cNvPr id="20" name="Group 19">
+            <a:extLst>
+              <a:ext uri="{FF2B5EF4-FFF2-40B4-BE49-F238E27FC236}">
+                <a16:creationId xmlns:a16="http://schemas.microsoft.com/office/drawing/2014/main" id="{8FF21C90-17F6-9342-8FD2-7AE09F374228}"/>
+              </a:ext>
+            </a:extLst>
+          </p:cNvPr>
+          <p:cNvGrpSpPr/>
+          <p:nvPr/>
+        </p:nvGrpSpPr>
+        <p:grpSpPr>
+          <a:xfrm>
+            <a:off x="7623604" y="2300910"/>
+            <a:ext cx="4112407" cy="1342674"/>
+            <a:chOff x="483796" y="3473604"/>
+            <a:chExt cx="3146096" cy="1080654"/>
+          </a:xfrm>
+        </p:grpSpPr>
+        <p:sp>
+          <p:nvSpPr>
+            <p:cNvPr id="21" name="Rounded Rectangle 20">
+              <a:extLst>
+                <a:ext uri="{FF2B5EF4-FFF2-40B4-BE49-F238E27FC236}">
+                  <a16:creationId xmlns:a16="http://schemas.microsoft.com/office/drawing/2014/main" id="{99DB37F3-56A6-1449-803F-699BE11B0DD0}"/>
+                </a:ext>
+              </a:extLst>
+            </p:cNvPr>
+            <p:cNvSpPr/>
+            <p:nvPr/>
+          </p:nvSpPr>
+          <p:spPr>
+            <a:xfrm>
+              <a:off x="498764" y="3473604"/>
+              <a:ext cx="3131128" cy="1080654"/>
+            </a:xfrm>
+            <a:prstGeom prst="roundRect">
+              <a:avLst/>
+            </a:prstGeom>
+            <a:solidFill>
+              <a:schemeClr val="bg1">
+                <a:lumMod val="75000"/>
+              </a:schemeClr>
+            </a:solidFill>
+          </p:spPr>
+          <p:style>
+            <a:lnRef idx="2">
+              <a:schemeClr val="accent1">
+                <a:shade val="50000"/>
+              </a:schemeClr>
+            </a:lnRef>
+            <a:fillRef idx="1">
+              <a:schemeClr val="accent1"/>
+            </a:fillRef>
+            <a:effectRef idx="0">
+              <a:schemeClr val="accent1"/>
+            </a:effectRef>
+            <a:fontRef idx="minor">
+              <a:schemeClr val="lt1"/>
+            </a:fontRef>
+          </p:style>
+          <p:txBody>
+            <a:bodyPr rtlCol="0" anchor="ctr"/>
+            <a:lstStyle/>
+            <a:p>
+              <a:pPr algn="ctr"/>
+              <a:endParaRPr lang="en-US" dirty="0"/>
+            </a:p>
+          </p:txBody>
+        </p:sp>
+        <p:sp>
+          <p:nvSpPr>
+            <p:cNvPr id="22" name="TextBox 21">
+              <a:extLst>
+                <a:ext uri="{FF2B5EF4-FFF2-40B4-BE49-F238E27FC236}">
+                  <a16:creationId xmlns:a16="http://schemas.microsoft.com/office/drawing/2014/main" id="{B4C2ADA5-73B3-C44E-A11F-DB5E7D4986BA}"/>
+                </a:ext>
+              </a:extLst>
+            </p:cNvPr>
+            <p:cNvSpPr txBox="1"/>
+            <p:nvPr/>
+          </p:nvSpPr>
+          <p:spPr>
+            <a:xfrm>
+              <a:off x="483796" y="3602672"/>
+              <a:ext cx="3131127" cy="631646"/>
+            </a:xfrm>
+            <a:prstGeom prst="rect">
+              <a:avLst/>
+            </a:prstGeom>
+            <a:noFill/>
+          </p:spPr>
+          <p:txBody>
+            <a:bodyPr wrap="square" rtlCol="0">
+              <a:spAutoFit/>
+            </a:bodyPr>
+            <a:lstStyle/>
+            <a:p>
+              <a:pPr algn="ctr"/>
+              <a:r>
+                <a:rPr lang="en-US" dirty="0"/>
+                <a:t>Compile Code (if needed)</a:t>
+              </a:r>
+            </a:p>
+          </p:txBody>
+        </p:sp>
+      </p:grpSp>
+      <p:sp>
+        <p:nvSpPr>
+          <p:cNvPr id="26" name="Rectangle 25">
+            <a:extLst>
+              <a:ext uri="{FF2B5EF4-FFF2-40B4-BE49-F238E27FC236}">
+                <a16:creationId xmlns:a16="http://schemas.microsoft.com/office/drawing/2014/main" id="{02A2FDED-04F0-DD49-9DFD-8E20F98DE539}"/>
+              </a:ext>
+            </a:extLst>
+          </p:cNvPr>
+          <p:cNvSpPr/>
+          <p:nvPr/>
+        </p:nvSpPr>
+        <p:spPr>
+          <a:xfrm>
+            <a:off x="7821534" y="2952474"/>
+            <a:ext cx="3736112" cy="430930"/>
+          </a:xfrm>
+          <a:prstGeom prst="rect">
+            <a:avLst/>
+          </a:prstGeom>
+          <a:solidFill>
+            <a:schemeClr val="bg1">
+              <a:lumMod val="85000"/>
+            </a:schemeClr>
+          </a:solidFill>
+          <a:ln>
+            <a:solidFill>
+              <a:schemeClr val="tx1"/>
+            </a:solidFill>
+          </a:ln>
+        </p:spPr>
+        <p:style>
+          <a:lnRef idx="2">
+            <a:schemeClr val="accent1">
+              <a:shade val="50000"/>
+            </a:schemeClr>
+          </a:lnRef>
+          <a:fillRef idx="1">
+            <a:schemeClr val="accent1"/>
+          </a:fillRef>
+          <a:effectRef idx="0">
+            <a:schemeClr val="accent1"/>
+          </a:effectRef>
+          <a:fontRef idx="minor">
+            <a:schemeClr val="lt1"/>
+          </a:fontRef>
+        </p:style>
+        <p:txBody>
+          <a:bodyPr rtlCol="0" anchor="ctr"/>
+          <a:lstStyle/>
+          <a:p>
+            <a:r>
+              <a:rPr lang="en-US" dirty="0">
+                <a:solidFill>
+                  <a:schemeClr val="tx1"/>
+                </a:solidFill>
+              </a:rPr>
+              <a:t>$ </a:t>
+            </a:r>
+            <a:r>
+              <a:rPr lang="en-US" dirty="0" err="1">
+                <a:solidFill>
+                  <a:schemeClr val="tx1"/>
+                </a:solidFill>
+              </a:rPr>
+              <a:t>acompile</a:t>
+            </a:r>
+            <a:r>
+              <a:rPr lang="en-US" dirty="0">
+                <a:solidFill>
+                  <a:schemeClr val="tx1"/>
+                </a:solidFill>
+              </a:rPr>
+              <a:t> –</a:t>
+            </a:r>
+            <a:r>
+              <a:rPr lang="en-US" dirty="0" err="1">
+                <a:solidFill>
+                  <a:schemeClr val="tx1"/>
+                </a:solidFill>
+              </a:rPr>
+              <a:t>ntasks</a:t>
+            </a:r>
+            <a:r>
+              <a:rPr lang="en-US" dirty="0">
+                <a:solidFill>
+                  <a:schemeClr val="tx1"/>
+                </a:solidFill>
+              </a:rPr>
+              <a:t>=2 –time=01:00:00</a:t>
+            </a:r>
+          </a:p>
+        </p:txBody>
+      </p:sp>
+      <p:grpSp>
+        <p:nvGrpSpPr>
+          <p:cNvPr id="51" name="Group 50">
+            <a:extLst>
+              <a:ext uri="{FF2B5EF4-FFF2-40B4-BE49-F238E27FC236}">
+                <a16:creationId xmlns:a16="http://schemas.microsoft.com/office/drawing/2014/main" id="{B1E32070-B2C0-C342-8818-A63B7F3BD652}"/>
+              </a:ext>
+            </a:extLst>
+          </p:cNvPr>
+          <p:cNvGrpSpPr/>
+          <p:nvPr/>
+        </p:nvGrpSpPr>
+        <p:grpSpPr>
+          <a:xfrm>
+            <a:off x="6489282" y="4445378"/>
+            <a:ext cx="3916413" cy="1724167"/>
+            <a:chOff x="6594673" y="4421120"/>
+            <a:chExt cx="3916413" cy="1724167"/>
+          </a:xfrm>
+        </p:grpSpPr>
+        <p:grpSp>
+          <p:nvGrpSpPr>
+            <p:cNvPr id="36" name="Group 35">
+              <a:extLst>
+                <a:ext uri="{FF2B5EF4-FFF2-40B4-BE49-F238E27FC236}">
+                  <a16:creationId xmlns:a16="http://schemas.microsoft.com/office/drawing/2014/main" id="{E7AA8142-22DE-704F-BA29-9B1497E5BD4C}"/>
+                </a:ext>
+              </a:extLst>
+            </p:cNvPr>
+            <p:cNvGrpSpPr/>
+            <p:nvPr/>
+          </p:nvGrpSpPr>
+          <p:grpSpPr>
+            <a:xfrm>
+              <a:off x="6594673" y="4421120"/>
+              <a:ext cx="3916413" cy="1724167"/>
+              <a:chOff x="423221" y="3429000"/>
+              <a:chExt cx="3206671" cy="1080654"/>
+            </a:xfrm>
+          </p:grpSpPr>
+          <p:sp>
+            <p:nvSpPr>
+              <p:cNvPr id="37" name="Rounded Rectangle 36">
+                <a:extLst>
+                  <a:ext uri="{FF2B5EF4-FFF2-40B4-BE49-F238E27FC236}">
+                    <a16:creationId xmlns:a16="http://schemas.microsoft.com/office/drawing/2014/main" id="{0E7F48A6-FD2D-E94F-B7E4-5BC593D45167}"/>
+                  </a:ext>
+                </a:extLst>
+              </p:cNvPr>
+              <p:cNvSpPr/>
+              <p:nvPr/>
+            </p:nvSpPr>
+            <p:spPr>
+              <a:xfrm>
+                <a:off x="498764" y="3429000"/>
+                <a:ext cx="3131128" cy="1080654"/>
+              </a:xfrm>
+              <a:prstGeom prst="roundRect">
+                <a:avLst/>
+              </a:prstGeom>
+              <a:solidFill>
+                <a:schemeClr val="bg1">
+                  <a:lumMod val="75000"/>
+                </a:schemeClr>
+              </a:solidFill>
+            </p:spPr>
+            <p:style>
+              <a:lnRef idx="2">
+                <a:schemeClr val="accent1">
+                  <a:shade val="50000"/>
+                </a:schemeClr>
+              </a:lnRef>
+              <a:fillRef idx="1">
+                <a:schemeClr val="accent1"/>
+              </a:fillRef>
+              <a:effectRef idx="0">
+                <a:schemeClr val="accent1"/>
+              </a:effectRef>
+              <a:fontRef idx="minor">
+                <a:schemeClr val="lt1"/>
+              </a:fontRef>
+            </p:style>
+            <p:txBody>
+              <a:bodyPr rtlCol="0" anchor="ctr"/>
+              <a:lstStyle/>
+              <a:p>
+                <a:pPr algn="ctr"/>
+                <a:endParaRPr lang="en-US"/>
+              </a:p>
+            </p:txBody>
+          </p:sp>
+          <p:sp>
+            <p:nvSpPr>
+              <p:cNvPr id="38" name="TextBox 37">
+                <a:extLst>
+                  <a:ext uri="{FF2B5EF4-FFF2-40B4-BE49-F238E27FC236}">
+                    <a16:creationId xmlns:a16="http://schemas.microsoft.com/office/drawing/2014/main" id="{03E3F8A1-DB01-9746-8742-B007EB60A55D}"/>
+                  </a:ext>
+                </a:extLst>
+              </p:cNvPr>
+              <p:cNvSpPr txBox="1"/>
+              <p:nvPr/>
+            </p:nvSpPr>
+            <p:spPr>
+              <a:xfrm>
+                <a:off x="423221" y="3456616"/>
+                <a:ext cx="3131127" cy="360941"/>
+              </a:xfrm>
+              <a:prstGeom prst="rect">
+                <a:avLst/>
+              </a:prstGeom>
+              <a:noFill/>
+            </p:spPr>
+            <p:txBody>
+              <a:bodyPr wrap="square" rtlCol="0">
+                <a:spAutoFit/>
+              </a:bodyPr>
+              <a:lstStyle/>
+              <a:p>
+                <a:pPr algn="ctr"/>
+                <a:r>
+                  <a:rPr lang="en-US" dirty="0"/>
+                  <a:t>Monitor Jobs</a:t>
+                </a:r>
+              </a:p>
+            </p:txBody>
+          </p:sp>
+        </p:grpSp>
+        <p:sp>
+          <p:nvSpPr>
+            <p:cNvPr id="43" name="Rectangle 42">
+              <a:extLst>
+                <a:ext uri="{FF2B5EF4-FFF2-40B4-BE49-F238E27FC236}">
+                  <a16:creationId xmlns:a16="http://schemas.microsoft.com/office/drawing/2014/main" id="{B0206C09-2A95-6042-81D0-C17C8042B8B3}"/>
+                </a:ext>
+              </a:extLst>
+            </p:cNvPr>
+            <p:cNvSpPr/>
+            <p:nvPr/>
+          </p:nvSpPr>
+          <p:spPr>
+            <a:xfrm>
+              <a:off x="6826091" y="4846968"/>
+              <a:ext cx="3545839" cy="430930"/>
+            </a:xfrm>
+            <a:prstGeom prst="rect">
+              <a:avLst/>
+            </a:prstGeom>
+            <a:solidFill>
+              <a:schemeClr val="bg1">
+                <a:lumMod val="85000"/>
+              </a:schemeClr>
+            </a:solidFill>
+            <a:ln>
+              <a:solidFill>
+                <a:schemeClr val="tx1"/>
+              </a:solidFill>
+            </a:ln>
+          </p:spPr>
+          <p:style>
+            <a:lnRef idx="2">
+              <a:schemeClr val="accent1">
+                <a:shade val="50000"/>
+              </a:schemeClr>
+            </a:lnRef>
+            <a:fillRef idx="1">
+              <a:schemeClr val="accent1"/>
+            </a:fillRef>
+            <a:effectRef idx="0">
+              <a:schemeClr val="accent1"/>
+            </a:effectRef>
+            <a:fontRef idx="minor">
+              <a:schemeClr val="lt1"/>
+            </a:fontRef>
+          </p:style>
+          <p:txBody>
+            <a:bodyPr rtlCol="0" anchor="ctr"/>
+            <a:lstStyle/>
+            <a:p>
+              <a:r>
+                <a:rPr lang="en-US" dirty="0">
+                  <a:solidFill>
+                    <a:schemeClr val="tx1"/>
+                  </a:solidFill>
+                </a:rPr>
+                <a:t>$ squeue --user=your_rc-username</a:t>
+              </a:r>
+            </a:p>
+          </p:txBody>
+        </p:sp>
+        <p:sp>
+          <p:nvSpPr>
+            <p:cNvPr id="44" name="Rectangle 43">
+              <a:extLst>
+                <a:ext uri="{FF2B5EF4-FFF2-40B4-BE49-F238E27FC236}">
+                  <a16:creationId xmlns:a16="http://schemas.microsoft.com/office/drawing/2014/main" id="{5141500B-46FB-984C-9F0C-C06B4BB83547}"/>
+                </a:ext>
+              </a:extLst>
+            </p:cNvPr>
+            <p:cNvSpPr/>
+            <p:nvPr/>
+          </p:nvSpPr>
+          <p:spPr>
+            <a:xfrm>
+              <a:off x="6826091" y="5512341"/>
+              <a:ext cx="3545839" cy="430930"/>
+            </a:xfrm>
+            <a:prstGeom prst="rect">
+              <a:avLst/>
+            </a:prstGeom>
+            <a:solidFill>
+              <a:schemeClr val="bg1">
+                <a:lumMod val="85000"/>
+              </a:schemeClr>
+            </a:solidFill>
+            <a:ln>
+              <a:solidFill>
+                <a:schemeClr val="tx1"/>
+              </a:solidFill>
+            </a:ln>
+          </p:spPr>
+          <p:style>
+            <a:lnRef idx="2">
+              <a:schemeClr val="accent1">
+                <a:shade val="50000"/>
+              </a:schemeClr>
+            </a:lnRef>
+            <a:fillRef idx="1">
+              <a:schemeClr val="accent1"/>
+            </a:fillRef>
+            <a:effectRef idx="0">
+              <a:schemeClr val="accent1"/>
+            </a:effectRef>
+            <a:fontRef idx="minor">
+              <a:schemeClr val="lt1"/>
+            </a:fontRef>
+          </p:style>
+          <p:txBody>
+            <a:bodyPr rtlCol="0" anchor="ctr"/>
+            <a:lstStyle/>
+            <a:p>
+              <a:r>
+                <a:rPr lang="en-US" dirty="0">
+                  <a:solidFill>
+                    <a:schemeClr val="tx1"/>
+                  </a:solidFill>
+                </a:rPr>
+                <a:t>$ sstat --jobs=your_job-id</a:t>
+              </a:r>
+            </a:p>
+          </p:txBody>
+        </p:sp>
+      </p:grpSp>
+      <p:cxnSp>
+        <p:nvCxnSpPr>
+          <p:cNvPr id="49" name="Straight Arrow Connector 48">
+            <a:extLst>
+              <a:ext uri="{FF2B5EF4-FFF2-40B4-BE49-F238E27FC236}">
+                <a16:creationId xmlns:a16="http://schemas.microsoft.com/office/drawing/2014/main" id="{19070675-C5C9-D84A-9118-E1BA6C8883B8}"/>
+              </a:ext>
+            </a:extLst>
+          </p:cNvPr>
+          <p:cNvCxnSpPr>
+            <a:cxnSpLocks/>
+            <a:stCxn id="7" idx="3"/>
+            <a:endCxn id="22" idx="1"/>
+          </p:cNvCxnSpPr>
+          <p:nvPr/>
+        </p:nvCxnSpPr>
+        <p:spPr>
+          <a:xfrm flipV="1">
+            <a:off x="6738275" y="2853671"/>
+            <a:ext cx="885329" cy="5278"/>
+          </a:xfrm>
+          <a:prstGeom prst="straightConnector1">
+            <a:avLst/>
+          </a:prstGeom>
+          <a:ln w="38100">
+            <a:solidFill>
+              <a:schemeClr val="tx1"/>
+            </a:solidFill>
+            <a:tailEnd type="triangle"/>
+          </a:ln>
+        </p:spPr>
+        <p:style>
+          <a:lnRef idx="1">
+            <a:schemeClr val="accent1"/>
+          </a:lnRef>
+          <a:fillRef idx="0">
+            <a:schemeClr val="accent1"/>
+          </a:fillRef>
+          <a:effectRef idx="0">
+            <a:schemeClr val="accent1"/>
+          </a:effectRef>
+          <a:fontRef idx="minor">
+            <a:schemeClr val="tx1"/>
+          </a:fontRef>
+        </p:style>
+      </p:cxnSp>
+      <p:cxnSp>
+        <p:nvCxnSpPr>
+          <p:cNvPr id="56" name="Elbow Connector 55">
+            <a:extLst>
+              <a:ext uri="{FF2B5EF4-FFF2-40B4-BE49-F238E27FC236}">
+                <a16:creationId xmlns:a16="http://schemas.microsoft.com/office/drawing/2014/main" id="{8E0710E8-C950-2D47-BD33-F28D0C6CE764}"/>
+              </a:ext>
+            </a:extLst>
+          </p:cNvPr>
+          <p:cNvCxnSpPr>
+            <a:cxnSpLocks/>
+            <a:stCxn id="21" idx="3"/>
+            <a:endCxn id="8" idx="0"/>
+          </p:cNvCxnSpPr>
+          <p:nvPr/>
+        </p:nvCxnSpPr>
+        <p:spPr>
+          <a:xfrm flipH="1">
+            <a:off x="3082054" y="2972247"/>
+            <a:ext cx="8653957" cy="2138002"/>
+          </a:xfrm>
+          <a:prstGeom prst="bentConnector4">
+            <a:avLst>
+              <a:gd name="adj1" fmla="val -1575"/>
+              <a:gd name="adj2" fmla="val 50148"/>
+            </a:avLst>
+          </a:prstGeom>
+          <a:ln w="38100">
+            <a:solidFill>
+              <a:schemeClr val="tx1"/>
+            </a:solidFill>
+            <a:tailEnd type="triangle"/>
+          </a:ln>
+        </p:spPr>
+        <p:style>
+          <a:lnRef idx="1">
+            <a:schemeClr val="accent1"/>
+          </a:lnRef>
+          <a:fillRef idx="0">
+            <a:schemeClr val="accent1"/>
+          </a:fillRef>
+          <a:effectRef idx="0">
+            <a:schemeClr val="accent1"/>
+          </a:effectRef>
+          <a:fontRef idx="minor">
+            <a:schemeClr val="tx1"/>
+          </a:fontRef>
+        </p:style>
+      </p:cxnSp>
+      <p:cxnSp>
+        <p:nvCxnSpPr>
+          <p:cNvPr id="60" name="Straight Arrow Connector 59">
+            <a:extLst>
+              <a:ext uri="{FF2B5EF4-FFF2-40B4-BE49-F238E27FC236}">
+                <a16:creationId xmlns:a16="http://schemas.microsoft.com/office/drawing/2014/main" id="{19CA2E73-533B-2E4D-918E-41610D156215}"/>
+              </a:ext>
+            </a:extLst>
+          </p:cNvPr>
+          <p:cNvCxnSpPr>
+            <a:cxnSpLocks/>
+            <a:stCxn id="8" idx="3"/>
+            <a:endCxn id="37" idx="1"/>
+          </p:cNvCxnSpPr>
+          <p:nvPr/>
+        </p:nvCxnSpPr>
+        <p:spPr>
+          <a:xfrm>
+            <a:off x="4377802" y="5307462"/>
+            <a:ext cx="2203743" cy="0"/>
+          </a:xfrm>
+          <a:prstGeom prst="straightConnector1">
+            <a:avLst/>
+          </a:prstGeom>
+          <a:ln w="38100">
+            <a:solidFill>
+              <a:schemeClr val="tx1"/>
+            </a:solidFill>
+            <a:tailEnd type="triangle"/>
+          </a:ln>
+        </p:spPr>
+        <p:style>
+          <a:lnRef idx="1">
+            <a:schemeClr val="accent1"/>
+          </a:lnRef>
+          <a:fillRef idx="0">
+            <a:schemeClr val="accent1"/>
+          </a:fillRef>
+          <a:effectRef idx="0">
+            <a:schemeClr val="accent1"/>
+          </a:effectRef>
+          <a:fontRef idx="minor">
+            <a:schemeClr val="tx1"/>
+          </a:fontRef>
+        </p:style>
+      </p:cxnSp>
     </p:spTree>
     <p:extLst>
       <p:ext uri="{BB962C8B-B14F-4D97-AF65-F5344CB8AC3E}">
@@ -6238,220 +6895,39 @@
       </p:sp>
       <p:sp>
         <p:nvSpPr>
-          <p:cNvPr id="4" name="TextBox 3">
+          <p:cNvPr id="11" name="Footer Placeholder 10">
             <a:extLst>
               <a:ext uri="{FF2B5EF4-FFF2-40B4-BE49-F238E27FC236}">
-                <a16:creationId xmlns:a16="http://schemas.microsoft.com/office/drawing/2014/main" id="{D99F9EE3-A384-4B48-AFE4-2B8A0C1956B1}"/>
+                <a16:creationId xmlns:a16="http://schemas.microsoft.com/office/drawing/2014/main" id="{1BD7E8F4-697D-9B42-9F56-188CB996C510}"/>
               </a:ext>
             </a:extLst>
           </p:cNvPr>
-          <p:cNvSpPr txBox="1"/>
-          <p:nvPr/>
-        </p:nvSpPr>
-        <p:spPr>
-          <a:xfrm>
-            <a:off x="914400" y="3429000"/>
-            <a:ext cx="1116106" cy="646331"/>
-          </a:xfrm>
-          <a:prstGeom prst="rect">
-            <a:avLst/>
-          </a:prstGeom>
-          <a:noFill/>
-        </p:spPr>
-        <p:txBody>
-          <a:bodyPr wrap="square" rtlCol="0">
-            <a:spAutoFit/>
-          </a:bodyPr>
+          <p:cNvSpPr>
+            <a:spLocks noGrp="1"/>
+          </p:cNvSpPr>
+          <p:nvPr>
+            <p:ph type="ftr" sz="quarter" idx="11"/>
+          </p:nvPr>
+        </p:nvSpPr>
+        <p:spPr/>
+        <p:txBody>
+          <a:bodyPr/>
           <a:lstStyle/>
           <a:p>
             <a:r>
-              <a:rPr lang="en-US" dirty="0"/>
-              <a:t>Login to HPC</a:t>
-            </a:r>
-          </a:p>
-        </p:txBody>
-      </p:sp>
-      <p:sp>
-        <p:nvSpPr>
-          <p:cNvPr id="5" name="TextBox 4">
+              <a:rPr lang="en-US"/>
+              <a:t>rc-help@colorado.edu</a:t>
+            </a:r>
+            <a:endParaRPr lang="en-US" dirty="0"/>
+          </a:p>
+        </p:txBody>
+      </p:sp>
+      <p:sp>
+        <p:nvSpPr>
+          <p:cNvPr id="14" name="Rounded Rectangle 13">
             <a:extLst>
               <a:ext uri="{FF2B5EF4-FFF2-40B4-BE49-F238E27FC236}">
-                <a16:creationId xmlns:a16="http://schemas.microsoft.com/office/drawing/2014/main" id="{DB3E258C-5DDD-6C40-A34C-3C2C2F19EF93}"/>
-              </a:ext>
-            </a:extLst>
-          </p:cNvPr>
-          <p:cNvSpPr txBox="1"/>
-          <p:nvPr/>
-        </p:nvSpPr>
-        <p:spPr>
-          <a:xfrm>
-            <a:off x="2635624" y="3429000"/>
-            <a:ext cx="1008529" cy="369332"/>
-          </a:xfrm>
-          <a:prstGeom prst="rect">
-            <a:avLst/>
-          </a:prstGeom>
-          <a:noFill/>
-        </p:spPr>
-        <p:txBody>
-          <a:bodyPr wrap="square" rtlCol="0">
-            <a:spAutoFit/>
-          </a:bodyPr>
-          <a:lstStyle/>
-          <a:p>
-            <a:r>
-              <a:rPr lang="en-US" dirty="0"/>
-              <a:t>CLI/Shell</a:t>
-            </a:r>
-          </a:p>
-        </p:txBody>
-      </p:sp>
-      <p:sp>
-        <p:nvSpPr>
-          <p:cNvPr id="6" name="TextBox 5">
-            <a:extLst>
-              <a:ext uri="{FF2B5EF4-FFF2-40B4-BE49-F238E27FC236}">
-                <a16:creationId xmlns:a16="http://schemas.microsoft.com/office/drawing/2014/main" id="{0AA900E7-0A48-7147-8588-C8D1124359FD}"/>
-              </a:ext>
-            </a:extLst>
-          </p:cNvPr>
-          <p:cNvSpPr txBox="1"/>
-          <p:nvPr/>
-        </p:nvSpPr>
-        <p:spPr>
-          <a:xfrm>
-            <a:off x="4531659" y="3307976"/>
-            <a:ext cx="1021976" cy="1754326"/>
-          </a:xfrm>
-          <a:prstGeom prst="rect">
-            <a:avLst/>
-          </a:prstGeom>
-          <a:noFill/>
-        </p:spPr>
-        <p:txBody>
-          <a:bodyPr wrap="square" rtlCol="0">
-            <a:spAutoFit/>
-          </a:bodyPr>
-          <a:lstStyle/>
-          <a:p>
-            <a:r>
-              <a:rPr lang="en-US" dirty="0"/>
-              <a:t>Slurm job script and code/application</a:t>
-            </a:r>
-          </a:p>
-        </p:txBody>
-      </p:sp>
-      <p:sp>
-        <p:nvSpPr>
-          <p:cNvPr id="7" name="TextBox 6">
-            <a:extLst>
-              <a:ext uri="{FF2B5EF4-FFF2-40B4-BE49-F238E27FC236}">
-                <a16:creationId xmlns:a16="http://schemas.microsoft.com/office/drawing/2014/main" id="{7E2A2A05-B4B8-7744-B24C-AABD17B05A2A}"/>
-              </a:ext>
-            </a:extLst>
-          </p:cNvPr>
-          <p:cNvSpPr txBox="1"/>
-          <p:nvPr/>
-        </p:nvSpPr>
-        <p:spPr>
-          <a:xfrm>
-            <a:off x="6096000" y="3890665"/>
-            <a:ext cx="1452283" cy="369332"/>
-          </a:xfrm>
-          <a:prstGeom prst="rect">
-            <a:avLst/>
-          </a:prstGeom>
-          <a:noFill/>
-        </p:spPr>
-        <p:txBody>
-          <a:bodyPr wrap="square" rtlCol="0">
-            <a:spAutoFit/>
-          </a:bodyPr>
-          <a:lstStyle/>
-          <a:p>
-            <a:r>
-              <a:rPr lang="en-US" dirty="0"/>
-              <a:t>SBATCH</a:t>
-            </a:r>
-          </a:p>
-        </p:txBody>
-      </p:sp>
-      <p:sp>
-        <p:nvSpPr>
-          <p:cNvPr id="8" name="TextBox 7">
-            <a:extLst>
-              <a:ext uri="{FF2B5EF4-FFF2-40B4-BE49-F238E27FC236}">
-                <a16:creationId xmlns:a16="http://schemas.microsoft.com/office/drawing/2014/main" id="{96359C3A-63DD-1247-94D8-544D5DB00FEE}"/>
-              </a:ext>
-            </a:extLst>
-          </p:cNvPr>
-          <p:cNvSpPr txBox="1"/>
-          <p:nvPr/>
-        </p:nvSpPr>
-        <p:spPr>
-          <a:xfrm>
-            <a:off x="8350624" y="3613666"/>
-            <a:ext cx="874058" cy="923330"/>
-          </a:xfrm>
-          <a:prstGeom prst="rect">
-            <a:avLst/>
-          </a:prstGeom>
-          <a:noFill/>
-        </p:spPr>
-        <p:txBody>
-          <a:bodyPr wrap="square" rtlCol="0">
-            <a:spAutoFit/>
-          </a:bodyPr>
-          <a:lstStyle/>
-          <a:p>
-            <a:r>
-              <a:rPr lang="en-US" dirty="0"/>
-              <a:t>Runs on HPC</a:t>
-            </a:r>
-          </a:p>
-        </p:txBody>
-      </p:sp>
-      <p:sp>
-        <p:nvSpPr>
-          <p:cNvPr id="9" name="TextBox 8">
-            <a:extLst>
-              <a:ext uri="{FF2B5EF4-FFF2-40B4-BE49-F238E27FC236}">
-                <a16:creationId xmlns:a16="http://schemas.microsoft.com/office/drawing/2014/main" id="{CADCE59C-ECE8-6645-AF13-EFA165141535}"/>
-              </a:ext>
-            </a:extLst>
-          </p:cNvPr>
-          <p:cNvSpPr txBox="1"/>
-          <p:nvPr/>
-        </p:nvSpPr>
-        <p:spPr>
-          <a:xfrm>
-            <a:off x="10206318" y="3429000"/>
-            <a:ext cx="1071282" cy="369332"/>
-          </a:xfrm>
-          <a:prstGeom prst="rect">
-            <a:avLst/>
-          </a:prstGeom>
-          <a:noFill/>
-        </p:spPr>
-        <p:txBody>
-          <a:bodyPr wrap="square" rtlCol="0">
-            <a:spAutoFit/>
-          </a:bodyPr>
-          <a:lstStyle/>
-          <a:p>
-            <a:r>
-              <a:rPr lang="en-US" dirty="0"/>
-              <a:t>output</a:t>
-            </a:r>
-          </a:p>
-        </p:txBody>
-      </p:sp>
-      <p:sp>
-        <p:nvSpPr>
-          <p:cNvPr id="10" name="Freeform 9">
-            <a:extLst>
-              <a:ext uri="{FF2B5EF4-FFF2-40B4-BE49-F238E27FC236}">
-                <a16:creationId xmlns:a16="http://schemas.microsoft.com/office/drawing/2014/main" id="{A15B4760-55F6-9C4B-BA7F-333DA72745F1}"/>
+                <a16:creationId xmlns:a16="http://schemas.microsoft.com/office/drawing/2014/main" id="{499985EC-FEA1-CD40-A0EA-7539D03DAD1B}"/>
               </a:ext>
             </a:extLst>
           </p:cNvPr>
@@ -6460,914 +6936,12 @@
         </p:nvSpPr>
         <p:spPr>
           <a:xfrm>
-            <a:off x="3402106" y="3778624"/>
-            <a:ext cx="7247965" cy="2218764"/>
+            <a:off x="702853" y="3390551"/>
+            <a:ext cx="1099127" cy="1044285"/>
           </a:xfrm>
-          <a:custGeom>
+          <a:prstGeom prst="roundRect">
             <a:avLst/>
-            <a:gdLst>
-              <a:gd name="connsiteX0" fmla="*/ 7247965 w 7247965"/>
-              <a:gd name="connsiteY0" fmla="*/ 67235 h 2218764"/>
-              <a:gd name="connsiteX1" fmla="*/ 7234518 w 7247965"/>
-              <a:gd name="connsiteY1" fmla="*/ 282388 h 2218764"/>
-              <a:gd name="connsiteX2" fmla="*/ 7194176 w 7247965"/>
-              <a:gd name="connsiteY2" fmla="*/ 376517 h 2218764"/>
-              <a:gd name="connsiteX3" fmla="*/ 7180729 w 7247965"/>
-              <a:gd name="connsiteY3" fmla="*/ 430305 h 2218764"/>
-              <a:gd name="connsiteX4" fmla="*/ 7126941 w 7247965"/>
-              <a:gd name="connsiteY4" fmla="*/ 510988 h 2218764"/>
-              <a:gd name="connsiteX5" fmla="*/ 7073153 w 7247965"/>
-              <a:gd name="connsiteY5" fmla="*/ 605117 h 2218764"/>
-              <a:gd name="connsiteX6" fmla="*/ 7046259 w 7247965"/>
-              <a:gd name="connsiteY6" fmla="*/ 645458 h 2218764"/>
-              <a:gd name="connsiteX7" fmla="*/ 7005918 w 7247965"/>
-              <a:gd name="connsiteY7" fmla="*/ 685800 h 2218764"/>
-              <a:gd name="connsiteX8" fmla="*/ 6979023 w 7247965"/>
-              <a:gd name="connsiteY8" fmla="*/ 726141 h 2218764"/>
-              <a:gd name="connsiteX9" fmla="*/ 6804212 w 7247965"/>
-              <a:gd name="connsiteY9" fmla="*/ 887505 h 2218764"/>
-              <a:gd name="connsiteX10" fmla="*/ 6750423 w 7247965"/>
-              <a:gd name="connsiteY10" fmla="*/ 941294 h 2218764"/>
-              <a:gd name="connsiteX11" fmla="*/ 6656294 w 7247965"/>
-              <a:gd name="connsiteY11" fmla="*/ 1008529 h 2218764"/>
-              <a:gd name="connsiteX12" fmla="*/ 6589059 w 7247965"/>
-              <a:gd name="connsiteY12" fmla="*/ 1062317 h 2218764"/>
-              <a:gd name="connsiteX13" fmla="*/ 6508376 w 7247965"/>
-              <a:gd name="connsiteY13" fmla="*/ 1116105 h 2218764"/>
-              <a:gd name="connsiteX14" fmla="*/ 6400800 w 7247965"/>
-              <a:gd name="connsiteY14" fmla="*/ 1196788 h 2218764"/>
-              <a:gd name="connsiteX15" fmla="*/ 6320118 w 7247965"/>
-              <a:gd name="connsiteY15" fmla="*/ 1237129 h 2218764"/>
-              <a:gd name="connsiteX16" fmla="*/ 6199094 w 7247965"/>
-              <a:gd name="connsiteY16" fmla="*/ 1331258 h 2218764"/>
-              <a:gd name="connsiteX17" fmla="*/ 6145306 w 7247965"/>
-              <a:gd name="connsiteY17" fmla="*/ 1371600 h 2218764"/>
-              <a:gd name="connsiteX18" fmla="*/ 6078070 w 7247965"/>
-              <a:gd name="connsiteY18" fmla="*/ 1425388 h 2218764"/>
-              <a:gd name="connsiteX19" fmla="*/ 6010835 w 7247965"/>
-              <a:gd name="connsiteY19" fmla="*/ 1465729 h 2218764"/>
-              <a:gd name="connsiteX20" fmla="*/ 5970494 w 7247965"/>
-              <a:gd name="connsiteY20" fmla="*/ 1506070 h 2218764"/>
-              <a:gd name="connsiteX21" fmla="*/ 5916706 w 7247965"/>
-              <a:gd name="connsiteY21" fmla="*/ 1546411 h 2218764"/>
-              <a:gd name="connsiteX22" fmla="*/ 5836023 w 7247965"/>
-              <a:gd name="connsiteY22" fmla="*/ 1600200 h 2218764"/>
-              <a:gd name="connsiteX23" fmla="*/ 5728447 w 7247965"/>
-              <a:gd name="connsiteY23" fmla="*/ 1667435 h 2218764"/>
-              <a:gd name="connsiteX24" fmla="*/ 5593976 w 7247965"/>
-              <a:gd name="connsiteY24" fmla="*/ 1761564 h 2218764"/>
-              <a:gd name="connsiteX25" fmla="*/ 5540188 w 7247965"/>
-              <a:gd name="connsiteY25" fmla="*/ 1788458 h 2218764"/>
-              <a:gd name="connsiteX26" fmla="*/ 5499847 w 7247965"/>
-              <a:gd name="connsiteY26" fmla="*/ 1815352 h 2218764"/>
-              <a:gd name="connsiteX27" fmla="*/ 5419165 w 7247965"/>
-              <a:gd name="connsiteY27" fmla="*/ 1855694 h 2218764"/>
-              <a:gd name="connsiteX28" fmla="*/ 5351929 w 7247965"/>
-              <a:gd name="connsiteY28" fmla="*/ 1896035 h 2218764"/>
-              <a:gd name="connsiteX29" fmla="*/ 5190565 w 7247965"/>
-              <a:gd name="connsiteY29" fmla="*/ 1976717 h 2218764"/>
-              <a:gd name="connsiteX30" fmla="*/ 5136776 w 7247965"/>
-              <a:gd name="connsiteY30" fmla="*/ 2003611 h 2218764"/>
-              <a:gd name="connsiteX31" fmla="*/ 5069541 w 7247965"/>
-              <a:gd name="connsiteY31" fmla="*/ 2043952 h 2218764"/>
-              <a:gd name="connsiteX32" fmla="*/ 4988859 w 7247965"/>
-              <a:gd name="connsiteY32" fmla="*/ 2070847 h 2218764"/>
-              <a:gd name="connsiteX33" fmla="*/ 4935070 w 7247965"/>
-              <a:gd name="connsiteY33" fmla="*/ 2097741 h 2218764"/>
-              <a:gd name="connsiteX34" fmla="*/ 4854388 w 7247965"/>
-              <a:gd name="connsiteY34" fmla="*/ 2124635 h 2218764"/>
-              <a:gd name="connsiteX35" fmla="*/ 4787153 w 7247965"/>
-              <a:gd name="connsiteY35" fmla="*/ 2151529 h 2218764"/>
-              <a:gd name="connsiteX36" fmla="*/ 4733365 w 7247965"/>
-              <a:gd name="connsiteY36" fmla="*/ 2164976 h 2218764"/>
-              <a:gd name="connsiteX37" fmla="*/ 4652682 w 7247965"/>
-              <a:gd name="connsiteY37" fmla="*/ 2191870 h 2218764"/>
-              <a:gd name="connsiteX38" fmla="*/ 4437529 w 7247965"/>
-              <a:gd name="connsiteY38" fmla="*/ 2218764 h 2218764"/>
-              <a:gd name="connsiteX39" fmla="*/ 3899647 w 7247965"/>
-              <a:gd name="connsiteY39" fmla="*/ 2205317 h 2218764"/>
-              <a:gd name="connsiteX40" fmla="*/ 3630706 w 7247965"/>
-              <a:gd name="connsiteY40" fmla="*/ 2164976 h 2218764"/>
-              <a:gd name="connsiteX41" fmla="*/ 3388659 w 7247965"/>
-              <a:gd name="connsiteY41" fmla="*/ 2138082 h 2218764"/>
-              <a:gd name="connsiteX42" fmla="*/ 3294529 w 7247965"/>
-              <a:gd name="connsiteY42" fmla="*/ 2124635 h 2218764"/>
-              <a:gd name="connsiteX43" fmla="*/ 3146612 w 7247965"/>
-              <a:gd name="connsiteY43" fmla="*/ 2097741 h 2218764"/>
-              <a:gd name="connsiteX44" fmla="*/ 2918012 w 7247965"/>
-              <a:gd name="connsiteY44" fmla="*/ 2070847 h 2218764"/>
-              <a:gd name="connsiteX45" fmla="*/ 2850776 w 7247965"/>
-              <a:gd name="connsiteY45" fmla="*/ 2057400 h 2218764"/>
-              <a:gd name="connsiteX46" fmla="*/ 2770094 w 7247965"/>
-              <a:gd name="connsiteY46" fmla="*/ 2043952 h 2218764"/>
-              <a:gd name="connsiteX47" fmla="*/ 2702859 w 7247965"/>
-              <a:gd name="connsiteY47" fmla="*/ 2017058 h 2218764"/>
-              <a:gd name="connsiteX48" fmla="*/ 2635623 w 7247965"/>
-              <a:gd name="connsiteY48" fmla="*/ 2003611 h 2218764"/>
-              <a:gd name="connsiteX49" fmla="*/ 2474259 w 7247965"/>
-              <a:gd name="connsiteY49" fmla="*/ 1963270 h 2218764"/>
-              <a:gd name="connsiteX50" fmla="*/ 2420470 w 7247965"/>
-              <a:gd name="connsiteY50" fmla="*/ 1949823 h 2218764"/>
-              <a:gd name="connsiteX51" fmla="*/ 2286000 w 7247965"/>
-              <a:gd name="connsiteY51" fmla="*/ 1896035 h 2218764"/>
-              <a:gd name="connsiteX52" fmla="*/ 2138082 w 7247965"/>
-              <a:gd name="connsiteY52" fmla="*/ 1855694 h 2218764"/>
-              <a:gd name="connsiteX53" fmla="*/ 2057400 w 7247965"/>
-              <a:gd name="connsiteY53" fmla="*/ 1828800 h 2218764"/>
-              <a:gd name="connsiteX54" fmla="*/ 1990165 w 7247965"/>
-              <a:gd name="connsiteY54" fmla="*/ 1801905 h 2218764"/>
-              <a:gd name="connsiteX55" fmla="*/ 1922929 w 7247965"/>
-              <a:gd name="connsiteY55" fmla="*/ 1788458 h 2218764"/>
-              <a:gd name="connsiteX56" fmla="*/ 1775012 w 7247965"/>
-              <a:gd name="connsiteY56" fmla="*/ 1734670 h 2218764"/>
-              <a:gd name="connsiteX57" fmla="*/ 1775012 w 7247965"/>
-              <a:gd name="connsiteY57" fmla="*/ 1734670 h 2218764"/>
-              <a:gd name="connsiteX58" fmla="*/ 1721223 w 7247965"/>
-              <a:gd name="connsiteY58" fmla="*/ 1707776 h 2218764"/>
-              <a:gd name="connsiteX59" fmla="*/ 1586753 w 7247965"/>
-              <a:gd name="connsiteY59" fmla="*/ 1667435 h 2218764"/>
-              <a:gd name="connsiteX60" fmla="*/ 1546412 w 7247965"/>
-              <a:gd name="connsiteY60" fmla="*/ 1640541 h 2218764"/>
-              <a:gd name="connsiteX61" fmla="*/ 1425388 w 7247965"/>
-              <a:gd name="connsiteY61" fmla="*/ 1600200 h 2218764"/>
-              <a:gd name="connsiteX62" fmla="*/ 1317812 w 7247965"/>
-              <a:gd name="connsiteY62" fmla="*/ 1559858 h 2218764"/>
-              <a:gd name="connsiteX63" fmla="*/ 1237129 w 7247965"/>
-              <a:gd name="connsiteY63" fmla="*/ 1532964 h 2218764"/>
-              <a:gd name="connsiteX64" fmla="*/ 1169894 w 7247965"/>
-              <a:gd name="connsiteY64" fmla="*/ 1506070 h 2218764"/>
-              <a:gd name="connsiteX65" fmla="*/ 1129553 w 7247965"/>
-              <a:gd name="connsiteY65" fmla="*/ 1479176 h 2218764"/>
-              <a:gd name="connsiteX66" fmla="*/ 1089212 w 7247965"/>
-              <a:gd name="connsiteY66" fmla="*/ 1465729 h 2218764"/>
-              <a:gd name="connsiteX67" fmla="*/ 968188 w 7247965"/>
-              <a:gd name="connsiteY67" fmla="*/ 1425388 h 2218764"/>
-              <a:gd name="connsiteX68" fmla="*/ 900953 w 7247965"/>
-              <a:gd name="connsiteY68" fmla="*/ 1385047 h 2218764"/>
-              <a:gd name="connsiteX69" fmla="*/ 847165 w 7247965"/>
-              <a:gd name="connsiteY69" fmla="*/ 1358152 h 2218764"/>
-              <a:gd name="connsiteX70" fmla="*/ 753035 w 7247965"/>
-              <a:gd name="connsiteY70" fmla="*/ 1304364 h 2218764"/>
-              <a:gd name="connsiteX71" fmla="*/ 658906 w 7247965"/>
-              <a:gd name="connsiteY71" fmla="*/ 1237129 h 2218764"/>
-              <a:gd name="connsiteX72" fmla="*/ 591670 w 7247965"/>
-              <a:gd name="connsiteY72" fmla="*/ 1169894 h 2218764"/>
-              <a:gd name="connsiteX73" fmla="*/ 551329 w 7247965"/>
-              <a:gd name="connsiteY73" fmla="*/ 1129552 h 2218764"/>
-              <a:gd name="connsiteX74" fmla="*/ 510988 w 7247965"/>
-              <a:gd name="connsiteY74" fmla="*/ 1102658 h 2218764"/>
-              <a:gd name="connsiteX75" fmla="*/ 484094 w 7247965"/>
-              <a:gd name="connsiteY75" fmla="*/ 1062317 h 2218764"/>
-              <a:gd name="connsiteX76" fmla="*/ 443753 w 7247965"/>
-              <a:gd name="connsiteY76" fmla="*/ 1021976 h 2218764"/>
-              <a:gd name="connsiteX77" fmla="*/ 430306 w 7247965"/>
-              <a:gd name="connsiteY77" fmla="*/ 981635 h 2218764"/>
-              <a:gd name="connsiteX78" fmla="*/ 389965 w 7247965"/>
-              <a:gd name="connsiteY78" fmla="*/ 941294 h 2218764"/>
-              <a:gd name="connsiteX79" fmla="*/ 349623 w 7247965"/>
-              <a:gd name="connsiteY79" fmla="*/ 847164 h 2218764"/>
-              <a:gd name="connsiteX80" fmla="*/ 295835 w 7247965"/>
-              <a:gd name="connsiteY80" fmla="*/ 739588 h 2218764"/>
-              <a:gd name="connsiteX81" fmla="*/ 268941 w 7247965"/>
-              <a:gd name="connsiteY81" fmla="*/ 699247 h 2218764"/>
-              <a:gd name="connsiteX82" fmla="*/ 242047 w 7247965"/>
-              <a:gd name="connsiteY82" fmla="*/ 632011 h 2218764"/>
-              <a:gd name="connsiteX83" fmla="*/ 188259 w 7247965"/>
-              <a:gd name="connsiteY83" fmla="*/ 524435 h 2218764"/>
-              <a:gd name="connsiteX84" fmla="*/ 174812 w 7247965"/>
-              <a:gd name="connsiteY84" fmla="*/ 470647 h 2218764"/>
-              <a:gd name="connsiteX85" fmla="*/ 121023 w 7247965"/>
-              <a:gd name="connsiteY85" fmla="*/ 376517 h 2218764"/>
-              <a:gd name="connsiteX86" fmla="*/ 67235 w 7247965"/>
-              <a:gd name="connsiteY86" fmla="*/ 255494 h 2218764"/>
-              <a:gd name="connsiteX87" fmla="*/ 13447 w 7247965"/>
-              <a:gd name="connsiteY87" fmla="*/ 94129 h 2218764"/>
-              <a:gd name="connsiteX88" fmla="*/ 0 w 7247965"/>
-              <a:gd name="connsiteY88" fmla="*/ 53788 h 2218764"/>
-              <a:gd name="connsiteX89" fmla="*/ 0 w 7247965"/>
-              <a:gd name="connsiteY89" fmla="*/ 0 h 2218764"/>
-            </a:gdLst>
-            <a:ahLst/>
-            <a:cxnLst>
-              <a:cxn ang="0">
-                <a:pos x="connsiteX0" y="connsiteY0"/>
-              </a:cxn>
-              <a:cxn ang="0">
-                <a:pos x="connsiteX1" y="connsiteY1"/>
-              </a:cxn>
-              <a:cxn ang="0">
-                <a:pos x="connsiteX2" y="connsiteY2"/>
-              </a:cxn>
-              <a:cxn ang="0">
-                <a:pos x="connsiteX3" y="connsiteY3"/>
-              </a:cxn>
-              <a:cxn ang="0">
-                <a:pos x="connsiteX4" y="connsiteY4"/>
-              </a:cxn>
-              <a:cxn ang="0">
-                <a:pos x="connsiteX5" y="connsiteY5"/>
-              </a:cxn>
-              <a:cxn ang="0">
-                <a:pos x="connsiteX6" y="connsiteY6"/>
-              </a:cxn>
-              <a:cxn ang="0">
-                <a:pos x="connsiteX7" y="connsiteY7"/>
-              </a:cxn>
-              <a:cxn ang="0">
-                <a:pos x="connsiteX8" y="connsiteY8"/>
-              </a:cxn>
-              <a:cxn ang="0">
-                <a:pos x="connsiteX9" y="connsiteY9"/>
-              </a:cxn>
-              <a:cxn ang="0">
-                <a:pos x="connsiteX10" y="connsiteY10"/>
-              </a:cxn>
-              <a:cxn ang="0">
-                <a:pos x="connsiteX11" y="connsiteY11"/>
-              </a:cxn>
-              <a:cxn ang="0">
-                <a:pos x="connsiteX12" y="connsiteY12"/>
-              </a:cxn>
-              <a:cxn ang="0">
-                <a:pos x="connsiteX13" y="connsiteY13"/>
-              </a:cxn>
-              <a:cxn ang="0">
-                <a:pos x="connsiteX14" y="connsiteY14"/>
-              </a:cxn>
-              <a:cxn ang="0">
-                <a:pos x="connsiteX15" y="connsiteY15"/>
-              </a:cxn>
-              <a:cxn ang="0">
-                <a:pos x="connsiteX16" y="connsiteY16"/>
-              </a:cxn>
-              <a:cxn ang="0">
-                <a:pos x="connsiteX17" y="connsiteY17"/>
-              </a:cxn>
-              <a:cxn ang="0">
-                <a:pos x="connsiteX18" y="connsiteY18"/>
-              </a:cxn>
-              <a:cxn ang="0">
-                <a:pos x="connsiteX19" y="connsiteY19"/>
-              </a:cxn>
-              <a:cxn ang="0">
-                <a:pos x="connsiteX20" y="connsiteY20"/>
-              </a:cxn>
-              <a:cxn ang="0">
-                <a:pos x="connsiteX21" y="connsiteY21"/>
-              </a:cxn>
-              <a:cxn ang="0">
-                <a:pos x="connsiteX22" y="connsiteY22"/>
-              </a:cxn>
-              <a:cxn ang="0">
-                <a:pos x="connsiteX23" y="connsiteY23"/>
-              </a:cxn>
-              <a:cxn ang="0">
-                <a:pos x="connsiteX24" y="connsiteY24"/>
-              </a:cxn>
-              <a:cxn ang="0">
-                <a:pos x="connsiteX25" y="connsiteY25"/>
-              </a:cxn>
-              <a:cxn ang="0">
-                <a:pos x="connsiteX26" y="connsiteY26"/>
-              </a:cxn>
-              <a:cxn ang="0">
-                <a:pos x="connsiteX27" y="connsiteY27"/>
-              </a:cxn>
-              <a:cxn ang="0">
-                <a:pos x="connsiteX28" y="connsiteY28"/>
-              </a:cxn>
-              <a:cxn ang="0">
-                <a:pos x="connsiteX29" y="connsiteY29"/>
-              </a:cxn>
-              <a:cxn ang="0">
-                <a:pos x="connsiteX30" y="connsiteY30"/>
-              </a:cxn>
-              <a:cxn ang="0">
-                <a:pos x="connsiteX31" y="connsiteY31"/>
-              </a:cxn>
-              <a:cxn ang="0">
-                <a:pos x="connsiteX32" y="connsiteY32"/>
-              </a:cxn>
-              <a:cxn ang="0">
-                <a:pos x="connsiteX33" y="connsiteY33"/>
-              </a:cxn>
-              <a:cxn ang="0">
-                <a:pos x="connsiteX34" y="connsiteY34"/>
-              </a:cxn>
-              <a:cxn ang="0">
-                <a:pos x="connsiteX35" y="connsiteY35"/>
-              </a:cxn>
-              <a:cxn ang="0">
-                <a:pos x="connsiteX36" y="connsiteY36"/>
-              </a:cxn>
-              <a:cxn ang="0">
-                <a:pos x="connsiteX37" y="connsiteY37"/>
-              </a:cxn>
-              <a:cxn ang="0">
-                <a:pos x="connsiteX38" y="connsiteY38"/>
-              </a:cxn>
-              <a:cxn ang="0">
-                <a:pos x="connsiteX39" y="connsiteY39"/>
-              </a:cxn>
-              <a:cxn ang="0">
-                <a:pos x="connsiteX40" y="connsiteY40"/>
-              </a:cxn>
-              <a:cxn ang="0">
-                <a:pos x="connsiteX41" y="connsiteY41"/>
-              </a:cxn>
-              <a:cxn ang="0">
-                <a:pos x="connsiteX42" y="connsiteY42"/>
-              </a:cxn>
-              <a:cxn ang="0">
-                <a:pos x="connsiteX43" y="connsiteY43"/>
-              </a:cxn>
-              <a:cxn ang="0">
-                <a:pos x="connsiteX44" y="connsiteY44"/>
-              </a:cxn>
-              <a:cxn ang="0">
-                <a:pos x="connsiteX45" y="connsiteY45"/>
-              </a:cxn>
-              <a:cxn ang="0">
-                <a:pos x="connsiteX46" y="connsiteY46"/>
-              </a:cxn>
-              <a:cxn ang="0">
-                <a:pos x="connsiteX47" y="connsiteY47"/>
-              </a:cxn>
-              <a:cxn ang="0">
-                <a:pos x="connsiteX48" y="connsiteY48"/>
-              </a:cxn>
-              <a:cxn ang="0">
-                <a:pos x="connsiteX49" y="connsiteY49"/>
-              </a:cxn>
-              <a:cxn ang="0">
-                <a:pos x="connsiteX50" y="connsiteY50"/>
-              </a:cxn>
-              <a:cxn ang="0">
-                <a:pos x="connsiteX51" y="connsiteY51"/>
-              </a:cxn>
-              <a:cxn ang="0">
-                <a:pos x="connsiteX52" y="connsiteY52"/>
-              </a:cxn>
-              <a:cxn ang="0">
-                <a:pos x="connsiteX53" y="connsiteY53"/>
-              </a:cxn>
-              <a:cxn ang="0">
-                <a:pos x="connsiteX54" y="connsiteY54"/>
-              </a:cxn>
-              <a:cxn ang="0">
-                <a:pos x="connsiteX55" y="connsiteY55"/>
-              </a:cxn>
-              <a:cxn ang="0">
-                <a:pos x="connsiteX56" y="connsiteY56"/>
-              </a:cxn>
-              <a:cxn ang="0">
-                <a:pos x="connsiteX57" y="connsiteY57"/>
-              </a:cxn>
-              <a:cxn ang="0">
-                <a:pos x="connsiteX58" y="connsiteY58"/>
-              </a:cxn>
-              <a:cxn ang="0">
-                <a:pos x="connsiteX59" y="connsiteY59"/>
-              </a:cxn>
-              <a:cxn ang="0">
-                <a:pos x="connsiteX60" y="connsiteY60"/>
-              </a:cxn>
-              <a:cxn ang="0">
-                <a:pos x="connsiteX61" y="connsiteY61"/>
-              </a:cxn>
-              <a:cxn ang="0">
-                <a:pos x="connsiteX62" y="connsiteY62"/>
-              </a:cxn>
-              <a:cxn ang="0">
-                <a:pos x="connsiteX63" y="connsiteY63"/>
-              </a:cxn>
-              <a:cxn ang="0">
-                <a:pos x="connsiteX64" y="connsiteY64"/>
-              </a:cxn>
-              <a:cxn ang="0">
-                <a:pos x="connsiteX65" y="connsiteY65"/>
-              </a:cxn>
-              <a:cxn ang="0">
-                <a:pos x="connsiteX66" y="connsiteY66"/>
-              </a:cxn>
-              <a:cxn ang="0">
-                <a:pos x="connsiteX67" y="connsiteY67"/>
-              </a:cxn>
-              <a:cxn ang="0">
-                <a:pos x="connsiteX68" y="connsiteY68"/>
-              </a:cxn>
-              <a:cxn ang="0">
-                <a:pos x="connsiteX69" y="connsiteY69"/>
-              </a:cxn>
-              <a:cxn ang="0">
-                <a:pos x="connsiteX70" y="connsiteY70"/>
-              </a:cxn>
-              <a:cxn ang="0">
-                <a:pos x="connsiteX71" y="connsiteY71"/>
-              </a:cxn>
-              <a:cxn ang="0">
-                <a:pos x="connsiteX72" y="connsiteY72"/>
-              </a:cxn>
-              <a:cxn ang="0">
-                <a:pos x="connsiteX73" y="connsiteY73"/>
-              </a:cxn>
-              <a:cxn ang="0">
-                <a:pos x="connsiteX74" y="connsiteY74"/>
-              </a:cxn>
-              <a:cxn ang="0">
-                <a:pos x="connsiteX75" y="connsiteY75"/>
-              </a:cxn>
-              <a:cxn ang="0">
-                <a:pos x="connsiteX76" y="connsiteY76"/>
-              </a:cxn>
-              <a:cxn ang="0">
-                <a:pos x="connsiteX77" y="connsiteY77"/>
-              </a:cxn>
-              <a:cxn ang="0">
-                <a:pos x="connsiteX78" y="connsiteY78"/>
-              </a:cxn>
-              <a:cxn ang="0">
-                <a:pos x="connsiteX79" y="connsiteY79"/>
-              </a:cxn>
-              <a:cxn ang="0">
-                <a:pos x="connsiteX80" y="connsiteY80"/>
-              </a:cxn>
-              <a:cxn ang="0">
-                <a:pos x="connsiteX81" y="connsiteY81"/>
-              </a:cxn>
-              <a:cxn ang="0">
-                <a:pos x="connsiteX82" y="connsiteY82"/>
-              </a:cxn>
-              <a:cxn ang="0">
-                <a:pos x="connsiteX83" y="connsiteY83"/>
-              </a:cxn>
-              <a:cxn ang="0">
-                <a:pos x="connsiteX84" y="connsiteY84"/>
-              </a:cxn>
-              <a:cxn ang="0">
-                <a:pos x="connsiteX85" y="connsiteY85"/>
-              </a:cxn>
-              <a:cxn ang="0">
-                <a:pos x="connsiteX86" y="connsiteY86"/>
-              </a:cxn>
-              <a:cxn ang="0">
-                <a:pos x="connsiteX87" y="connsiteY87"/>
-              </a:cxn>
-              <a:cxn ang="0">
-                <a:pos x="connsiteX88" y="connsiteY88"/>
-              </a:cxn>
-              <a:cxn ang="0">
-                <a:pos x="connsiteX89" y="connsiteY89"/>
-              </a:cxn>
-            </a:cxnLst>
-            <a:rect l="l" t="t" r="r" b="b"/>
-            <a:pathLst>
-              <a:path w="7247965" h="2218764">
-                <a:moveTo>
-                  <a:pt x="7247965" y="67235"/>
-                </a:moveTo>
-                <a:cubicBezTo>
-                  <a:pt x="7243483" y="138953"/>
-                  <a:pt x="7242041" y="210925"/>
-                  <a:pt x="7234518" y="282388"/>
-                </a:cubicBezTo>
-                <a:cubicBezTo>
-                  <a:pt x="7231261" y="313332"/>
-                  <a:pt x="7204032" y="350234"/>
-                  <a:pt x="7194176" y="376517"/>
-                </a:cubicBezTo>
-                <a:cubicBezTo>
-                  <a:pt x="7187687" y="393821"/>
-                  <a:pt x="7188994" y="413775"/>
-                  <a:pt x="7180729" y="430305"/>
-                </a:cubicBezTo>
-                <a:cubicBezTo>
-                  <a:pt x="7166274" y="459215"/>
-                  <a:pt x="7137162" y="480324"/>
-                  <a:pt x="7126941" y="510988"/>
-                </a:cubicBezTo>
-                <a:cubicBezTo>
-                  <a:pt x="7105120" y="576452"/>
-                  <a:pt x="7124034" y="533884"/>
-                  <a:pt x="7073153" y="605117"/>
-                </a:cubicBezTo>
-                <a:cubicBezTo>
-                  <a:pt x="7063759" y="618268"/>
-                  <a:pt x="7056605" y="633042"/>
-                  <a:pt x="7046259" y="645458"/>
-                </a:cubicBezTo>
-                <a:cubicBezTo>
-                  <a:pt x="7034085" y="660067"/>
-                  <a:pt x="7018093" y="671191"/>
-                  <a:pt x="7005918" y="685800"/>
-                </a:cubicBezTo>
-                <a:cubicBezTo>
-                  <a:pt x="6995572" y="698216"/>
-                  <a:pt x="6989760" y="714062"/>
-                  <a:pt x="6979023" y="726141"/>
-                </a:cubicBezTo>
-                <a:cubicBezTo>
-                  <a:pt x="6905506" y="808847"/>
-                  <a:pt x="6887684" y="811621"/>
-                  <a:pt x="6804212" y="887505"/>
-                </a:cubicBezTo>
-                <a:cubicBezTo>
-                  <a:pt x="6785450" y="904562"/>
-                  <a:pt x="6769506" y="924597"/>
-                  <a:pt x="6750423" y="941294"/>
-                </a:cubicBezTo>
-                <a:cubicBezTo>
-                  <a:pt x="6695888" y="989012"/>
-                  <a:pt x="6706498" y="970876"/>
-                  <a:pt x="6656294" y="1008529"/>
-                </a:cubicBezTo>
-                <a:cubicBezTo>
-                  <a:pt x="6633333" y="1025750"/>
-                  <a:pt x="6612271" y="1045436"/>
-                  <a:pt x="6589059" y="1062317"/>
-                </a:cubicBezTo>
-                <a:cubicBezTo>
-                  <a:pt x="6562918" y="1081328"/>
-                  <a:pt x="6534678" y="1097318"/>
-                  <a:pt x="6508376" y="1116105"/>
-                </a:cubicBezTo>
-                <a:cubicBezTo>
-                  <a:pt x="6471902" y="1142158"/>
-                  <a:pt x="6440891" y="1176742"/>
-                  <a:pt x="6400800" y="1196788"/>
-                </a:cubicBezTo>
-                <a:cubicBezTo>
-                  <a:pt x="6373906" y="1210235"/>
-                  <a:pt x="6345136" y="1220450"/>
-                  <a:pt x="6320118" y="1237129"/>
-                </a:cubicBezTo>
-                <a:cubicBezTo>
-                  <a:pt x="6277595" y="1265478"/>
-                  <a:pt x="6239602" y="1300098"/>
-                  <a:pt x="6199094" y="1331258"/>
-                </a:cubicBezTo>
-                <a:cubicBezTo>
-                  <a:pt x="6181330" y="1344923"/>
-                  <a:pt x="6162997" y="1357840"/>
-                  <a:pt x="6145306" y="1371600"/>
-                </a:cubicBezTo>
-                <a:cubicBezTo>
-                  <a:pt x="6122651" y="1389221"/>
-                  <a:pt x="6102681" y="1410621"/>
-                  <a:pt x="6078070" y="1425388"/>
-                </a:cubicBezTo>
-                <a:cubicBezTo>
-                  <a:pt x="6055658" y="1438835"/>
-                  <a:pt x="6031744" y="1450047"/>
-                  <a:pt x="6010835" y="1465729"/>
-                </a:cubicBezTo>
-                <a:cubicBezTo>
-                  <a:pt x="5995621" y="1477139"/>
-                  <a:pt x="5984933" y="1493694"/>
-                  <a:pt x="5970494" y="1506070"/>
-                </a:cubicBezTo>
-                <a:cubicBezTo>
-                  <a:pt x="5953478" y="1520655"/>
-                  <a:pt x="5935066" y="1533559"/>
-                  <a:pt x="5916706" y="1546411"/>
-                </a:cubicBezTo>
-                <a:cubicBezTo>
-                  <a:pt x="5890226" y="1564947"/>
-                  <a:pt x="5863293" y="1582847"/>
-                  <a:pt x="5836023" y="1600200"/>
-                </a:cubicBezTo>
-                <a:cubicBezTo>
-                  <a:pt x="5778446" y="1636840"/>
-                  <a:pt x="5775994" y="1633473"/>
-                  <a:pt x="5728447" y="1667435"/>
-                </a:cubicBezTo>
-                <a:cubicBezTo>
-                  <a:pt x="5664084" y="1713408"/>
-                  <a:pt x="5671264" y="1715191"/>
-                  <a:pt x="5593976" y="1761564"/>
-                </a:cubicBezTo>
-                <a:cubicBezTo>
-                  <a:pt x="5576787" y="1771877"/>
-                  <a:pt x="5557592" y="1778513"/>
-                  <a:pt x="5540188" y="1788458"/>
-                </a:cubicBezTo>
-                <a:cubicBezTo>
-                  <a:pt x="5526156" y="1796476"/>
-                  <a:pt x="5513974" y="1807503"/>
-                  <a:pt x="5499847" y="1815352"/>
-                </a:cubicBezTo>
-                <a:cubicBezTo>
-                  <a:pt x="5473562" y="1829955"/>
-                  <a:pt x="5445562" y="1841296"/>
-                  <a:pt x="5419165" y="1855694"/>
-                </a:cubicBezTo>
-                <a:cubicBezTo>
-                  <a:pt x="5396220" y="1868210"/>
-                  <a:pt x="5375028" y="1883806"/>
-                  <a:pt x="5351929" y="1896035"/>
-                </a:cubicBezTo>
-                <a:cubicBezTo>
-                  <a:pt x="5298781" y="1924172"/>
-                  <a:pt x="5244353" y="1949823"/>
-                  <a:pt x="5190565" y="1976717"/>
-                </a:cubicBezTo>
-                <a:cubicBezTo>
-                  <a:pt x="5172635" y="1985682"/>
-                  <a:pt x="5153965" y="1993297"/>
-                  <a:pt x="5136776" y="2003611"/>
-                </a:cubicBezTo>
-                <a:cubicBezTo>
-                  <a:pt x="5114364" y="2017058"/>
-                  <a:pt x="5093335" y="2033137"/>
-                  <a:pt x="5069541" y="2043952"/>
-                </a:cubicBezTo>
-                <a:cubicBezTo>
-                  <a:pt x="5043733" y="2055683"/>
-                  <a:pt x="5015180" y="2060318"/>
-                  <a:pt x="4988859" y="2070847"/>
-                </a:cubicBezTo>
-                <a:cubicBezTo>
-                  <a:pt x="4970247" y="2078292"/>
-                  <a:pt x="4953682" y="2090296"/>
-                  <a:pt x="4935070" y="2097741"/>
-                </a:cubicBezTo>
-                <a:cubicBezTo>
-                  <a:pt x="4908749" y="2108269"/>
-                  <a:pt x="4881030" y="2114947"/>
-                  <a:pt x="4854388" y="2124635"/>
-                </a:cubicBezTo>
-                <a:cubicBezTo>
-                  <a:pt x="4831703" y="2132884"/>
-                  <a:pt x="4810052" y="2143896"/>
-                  <a:pt x="4787153" y="2151529"/>
-                </a:cubicBezTo>
-                <a:cubicBezTo>
-                  <a:pt x="4769620" y="2157373"/>
-                  <a:pt x="4751067" y="2159666"/>
-                  <a:pt x="4733365" y="2164976"/>
-                </a:cubicBezTo>
-                <a:cubicBezTo>
-                  <a:pt x="4706211" y="2173122"/>
-                  <a:pt x="4680858" y="2188739"/>
-                  <a:pt x="4652682" y="2191870"/>
-                </a:cubicBezTo>
-                <a:cubicBezTo>
-                  <a:pt x="4500158" y="2208817"/>
-                  <a:pt x="4571840" y="2199577"/>
-                  <a:pt x="4437529" y="2218764"/>
-                </a:cubicBezTo>
-                <a:lnTo>
-                  <a:pt x="3899647" y="2205317"/>
-                </a:lnTo>
-                <a:cubicBezTo>
-                  <a:pt x="3819723" y="2201987"/>
-                  <a:pt x="3704343" y="2172340"/>
-                  <a:pt x="3630706" y="2164976"/>
-                </a:cubicBezTo>
-                <a:cubicBezTo>
-                  <a:pt x="3507727" y="2152678"/>
-                  <a:pt x="3502869" y="2153310"/>
-                  <a:pt x="3388659" y="2138082"/>
-                </a:cubicBezTo>
-                <a:cubicBezTo>
-                  <a:pt x="3357242" y="2133893"/>
-                  <a:pt x="3325793" y="2129846"/>
-                  <a:pt x="3294529" y="2124635"/>
-                </a:cubicBezTo>
-                <a:cubicBezTo>
-                  <a:pt x="3042764" y="2082674"/>
-                  <a:pt x="3438076" y="2142581"/>
-                  <a:pt x="3146612" y="2097741"/>
-                </a:cubicBezTo>
-                <a:cubicBezTo>
-                  <a:pt x="2892405" y="2058632"/>
-                  <a:pt x="3248151" y="2114865"/>
-                  <a:pt x="2918012" y="2070847"/>
-                </a:cubicBezTo>
-                <a:cubicBezTo>
-                  <a:pt x="2895357" y="2067826"/>
-                  <a:pt x="2873263" y="2061489"/>
-                  <a:pt x="2850776" y="2057400"/>
-                </a:cubicBezTo>
-                <a:cubicBezTo>
-                  <a:pt x="2823951" y="2052523"/>
-                  <a:pt x="2796988" y="2048435"/>
-                  <a:pt x="2770094" y="2043952"/>
-                </a:cubicBezTo>
-                <a:cubicBezTo>
-                  <a:pt x="2747682" y="2034987"/>
-                  <a:pt x="2725979" y="2023994"/>
-                  <a:pt x="2702859" y="2017058"/>
-                </a:cubicBezTo>
-                <a:cubicBezTo>
-                  <a:pt x="2680967" y="2010490"/>
-                  <a:pt x="2657894" y="2008750"/>
-                  <a:pt x="2635623" y="2003611"/>
-                </a:cubicBezTo>
-                <a:cubicBezTo>
-                  <a:pt x="2635616" y="2003609"/>
-                  <a:pt x="2501156" y="1969994"/>
-                  <a:pt x="2474259" y="1963270"/>
-                </a:cubicBezTo>
-                <a:cubicBezTo>
-                  <a:pt x="2456329" y="1958788"/>
-                  <a:pt x="2438003" y="1955667"/>
-                  <a:pt x="2420470" y="1949823"/>
-                </a:cubicBezTo>
-                <a:cubicBezTo>
-                  <a:pt x="2236826" y="1888608"/>
-                  <a:pt x="2424502" y="1955393"/>
-                  <a:pt x="2286000" y="1896035"/>
-                </a:cubicBezTo>
-                <a:cubicBezTo>
-                  <a:pt x="2245288" y="1878587"/>
-                  <a:pt x="2168937" y="1865979"/>
-                  <a:pt x="2138082" y="1855694"/>
-                </a:cubicBezTo>
-                <a:cubicBezTo>
-                  <a:pt x="2111188" y="1846729"/>
-                  <a:pt x="2083721" y="1839329"/>
-                  <a:pt x="2057400" y="1828800"/>
-                </a:cubicBezTo>
-                <a:cubicBezTo>
-                  <a:pt x="2034988" y="1819835"/>
-                  <a:pt x="2013285" y="1808841"/>
-                  <a:pt x="1990165" y="1801905"/>
-                </a:cubicBezTo>
-                <a:cubicBezTo>
-                  <a:pt x="1968273" y="1795337"/>
-                  <a:pt x="1945341" y="1792940"/>
-                  <a:pt x="1922929" y="1788458"/>
-                </a:cubicBezTo>
-                <a:cubicBezTo>
-                  <a:pt x="1851834" y="1741061"/>
-                  <a:pt x="1898267" y="1765484"/>
-                  <a:pt x="1775012" y="1734670"/>
-                </a:cubicBezTo>
-                <a:lnTo>
-                  <a:pt x="1775012" y="1734670"/>
-                </a:lnTo>
-                <a:cubicBezTo>
-                  <a:pt x="1757082" y="1725705"/>
-                  <a:pt x="1739835" y="1715221"/>
-                  <a:pt x="1721223" y="1707776"/>
-                </a:cubicBezTo>
-                <a:cubicBezTo>
-                  <a:pt x="1666658" y="1685950"/>
-                  <a:pt x="1639587" y="1680644"/>
-                  <a:pt x="1586753" y="1667435"/>
-                </a:cubicBezTo>
-                <a:cubicBezTo>
-                  <a:pt x="1573306" y="1658470"/>
-                  <a:pt x="1560867" y="1647768"/>
-                  <a:pt x="1546412" y="1640541"/>
-                </a:cubicBezTo>
-                <a:cubicBezTo>
-                  <a:pt x="1484592" y="1609631"/>
-                  <a:pt x="1485310" y="1617321"/>
-                  <a:pt x="1425388" y="1600200"/>
-                </a:cubicBezTo>
-                <a:cubicBezTo>
-                  <a:pt x="1378776" y="1586882"/>
-                  <a:pt x="1369891" y="1578796"/>
-                  <a:pt x="1317812" y="1559858"/>
-                </a:cubicBezTo>
-                <a:cubicBezTo>
-                  <a:pt x="1291170" y="1550170"/>
-                  <a:pt x="1263450" y="1543493"/>
-                  <a:pt x="1237129" y="1532964"/>
-                </a:cubicBezTo>
-                <a:cubicBezTo>
-                  <a:pt x="1214717" y="1523999"/>
-                  <a:pt x="1191484" y="1516865"/>
-                  <a:pt x="1169894" y="1506070"/>
-                </a:cubicBezTo>
-                <a:cubicBezTo>
-                  <a:pt x="1155439" y="1498842"/>
-                  <a:pt x="1144008" y="1486404"/>
-                  <a:pt x="1129553" y="1479176"/>
-                </a:cubicBezTo>
-                <a:cubicBezTo>
-                  <a:pt x="1116875" y="1472837"/>
-                  <a:pt x="1102484" y="1470706"/>
-                  <a:pt x="1089212" y="1465729"/>
-                </a:cubicBezTo>
-                <a:cubicBezTo>
-                  <a:pt x="987939" y="1427752"/>
-                  <a:pt x="1058316" y="1447920"/>
-                  <a:pt x="968188" y="1425388"/>
-                </a:cubicBezTo>
-                <a:cubicBezTo>
-                  <a:pt x="945776" y="1411941"/>
-                  <a:pt x="923800" y="1397740"/>
-                  <a:pt x="900953" y="1385047"/>
-                </a:cubicBezTo>
-                <a:cubicBezTo>
-                  <a:pt x="883430" y="1375312"/>
-                  <a:pt x="864164" y="1368776"/>
-                  <a:pt x="847165" y="1358152"/>
-                </a:cubicBezTo>
-                <a:cubicBezTo>
-                  <a:pt x="754128" y="1300004"/>
-                  <a:pt x="832288" y="1330782"/>
-                  <a:pt x="753035" y="1304364"/>
-                </a:cubicBezTo>
-                <a:cubicBezTo>
-                  <a:pt x="614569" y="1165898"/>
-                  <a:pt x="818195" y="1361020"/>
-                  <a:pt x="658906" y="1237129"/>
-                </a:cubicBezTo>
-                <a:cubicBezTo>
-                  <a:pt x="633887" y="1217670"/>
-                  <a:pt x="614082" y="1192306"/>
-                  <a:pt x="591670" y="1169894"/>
-                </a:cubicBezTo>
-                <a:cubicBezTo>
-                  <a:pt x="578223" y="1156447"/>
-                  <a:pt x="567152" y="1140101"/>
-                  <a:pt x="551329" y="1129552"/>
-                </a:cubicBezTo>
-                <a:lnTo>
-                  <a:pt x="510988" y="1102658"/>
-                </a:lnTo>
-                <a:cubicBezTo>
-                  <a:pt x="502023" y="1089211"/>
-                  <a:pt x="494440" y="1074732"/>
-                  <a:pt x="484094" y="1062317"/>
-                </a:cubicBezTo>
-                <a:cubicBezTo>
-                  <a:pt x="471920" y="1047708"/>
-                  <a:pt x="454302" y="1037799"/>
-                  <a:pt x="443753" y="1021976"/>
-                </a:cubicBezTo>
-                <a:cubicBezTo>
-                  <a:pt x="435890" y="1010182"/>
-                  <a:pt x="438169" y="993429"/>
-                  <a:pt x="430306" y="981635"/>
-                </a:cubicBezTo>
-                <a:cubicBezTo>
-                  <a:pt x="419757" y="965812"/>
-                  <a:pt x="401018" y="956769"/>
-                  <a:pt x="389965" y="941294"/>
-                </a:cubicBezTo>
-                <a:cubicBezTo>
-                  <a:pt x="353673" y="890485"/>
-                  <a:pt x="371572" y="895451"/>
-                  <a:pt x="349623" y="847164"/>
-                </a:cubicBezTo>
-                <a:cubicBezTo>
-                  <a:pt x="333033" y="810666"/>
-                  <a:pt x="318074" y="772946"/>
-                  <a:pt x="295835" y="739588"/>
-                </a:cubicBezTo>
-                <a:cubicBezTo>
-                  <a:pt x="286870" y="726141"/>
-                  <a:pt x="276168" y="713702"/>
-                  <a:pt x="268941" y="699247"/>
-                </a:cubicBezTo>
-                <a:cubicBezTo>
-                  <a:pt x="258146" y="677657"/>
-                  <a:pt x="252162" y="653928"/>
-                  <a:pt x="242047" y="632011"/>
-                </a:cubicBezTo>
-                <a:cubicBezTo>
-                  <a:pt x="225247" y="595610"/>
-                  <a:pt x="197983" y="563329"/>
-                  <a:pt x="188259" y="524435"/>
-                </a:cubicBezTo>
-                <a:cubicBezTo>
-                  <a:pt x="183777" y="506506"/>
-                  <a:pt x="181301" y="487951"/>
-                  <a:pt x="174812" y="470647"/>
-                </a:cubicBezTo>
-                <a:cubicBezTo>
-                  <a:pt x="160187" y="431646"/>
-                  <a:pt x="143319" y="409960"/>
-                  <a:pt x="121023" y="376517"/>
-                </a:cubicBezTo>
-                <a:cubicBezTo>
-                  <a:pt x="89018" y="280503"/>
-                  <a:pt x="109854" y="319423"/>
-                  <a:pt x="67235" y="255494"/>
-                </a:cubicBezTo>
-                <a:lnTo>
-                  <a:pt x="13447" y="94129"/>
-                </a:lnTo>
-                <a:cubicBezTo>
-                  <a:pt x="8965" y="80682"/>
-                  <a:pt x="0" y="67962"/>
-                  <a:pt x="0" y="53788"/>
-                </a:cubicBezTo>
-                <a:lnTo>
-                  <a:pt x="0" y="0"/>
-                </a:lnTo>
-              </a:path>
-            </a:pathLst>
-          </a:custGeom>
-          <a:noFill/>
-          <a:ln>
-            <a:tailEnd type="triangle"/>
-          </a:ln>
+          </a:prstGeom>
         </p:spPr>
         <p:style>
           <a:lnRef idx="2">
@@ -7390,39 +6964,537 @@
           <a:lstStyle/>
           <a:p>
             <a:pPr algn="ctr"/>
-            <a:endParaRPr lang="en-US"/>
-          </a:p>
-        </p:txBody>
-      </p:sp>
-      <p:sp>
-        <p:nvSpPr>
-          <p:cNvPr id="11" name="Footer Placeholder 10">
+            <a:r>
+              <a:rPr lang="en-US" dirty="0"/>
+              <a:t>Login to HPC</a:t>
+            </a:r>
+          </a:p>
+        </p:txBody>
+      </p:sp>
+      <p:grpSp>
+        <p:nvGrpSpPr>
+          <p:cNvPr id="19" name="Group 18">
             <a:extLst>
               <a:ext uri="{FF2B5EF4-FFF2-40B4-BE49-F238E27FC236}">
-                <a16:creationId xmlns:a16="http://schemas.microsoft.com/office/drawing/2014/main" id="{1BD7E8F4-697D-9B42-9F56-188CB996C510}"/>
+                <a16:creationId xmlns:a16="http://schemas.microsoft.com/office/drawing/2014/main" id="{C5775FF9-03C9-D045-BA98-D81A987B56F8}"/>
               </a:ext>
             </a:extLst>
           </p:cNvPr>
-          <p:cNvSpPr>
-            <a:spLocks noGrp="1"/>
-          </p:cNvSpPr>
-          <p:nvPr>
-            <p:ph type="ftr" sz="quarter" idx="11"/>
-          </p:nvPr>
-        </p:nvSpPr>
-        <p:spPr/>
-        <p:txBody>
-          <a:bodyPr/>
-          <a:lstStyle/>
-          <a:p>
-            <a:r>
-              <a:rPr lang="en-US"/>
-              <a:t>rc-help@colorado.edu</a:t>
-            </a:r>
-            <a:endParaRPr lang="en-US" dirty="0"/>
-          </a:p>
-        </p:txBody>
-      </p:sp>
+          <p:cNvGrpSpPr/>
+          <p:nvPr/>
+        </p:nvGrpSpPr>
+        <p:grpSpPr>
+          <a:xfrm>
+            <a:off x="2548512" y="3387187"/>
+            <a:ext cx="2874847" cy="1234176"/>
+            <a:chOff x="2851698" y="3827007"/>
+            <a:chExt cx="2874847" cy="1758982"/>
+          </a:xfrm>
+        </p:grpSpPr>
+        <p:sp>
+          <p:nvSpPr>
+            <p:cNvPr id="15" name="Rounded Rectangle 14">
+              <a:extLst>
+                <a:ext uri="{FF2B5EF4-FFF2-40B4-BE49-F238E27FC236}">
+                  <a16:creationId xmlns:a16="http://schemas.microsoft.com/office/drawing/2014/main" id="{A6C7572C-1E46-854F-BDB7-9DD3DD037AB2}"/>
+                </a:ext>
+              </a:extLst>
+            </p:cNvPr>
+            <p:cNvSpPr/>
+            <p:nvPr/>
+          </p:nvSpPr>
+          <p:spPr>
+            <a:xfrm>
+              <a:off x="2851698" y="3827007"/>
+              <a:ext cx="2874847" cy="1493138"/>
+            </a:xfrm>
+            <a:prstGeom prst="roundRect">
+              <a:avLst/>
+            </a:prstGeom>
+          </p:spPr>
+          <p:style>
+            <a:lnRef idx="2">
+              <a:schemeClr val="accent1">
+                <a:shade val="50000"/>
+              </a:schemeClr>
+            </a:lnRef>
+            <a:fillRef idx="1">
+              <a:schemeClr val="accent1"/>
+            </a:fillRef>
+            <a:effectRef idx="0">
+              <a:schemeClr val="accent1"/>
+            </a:effectRef>
+            <a:fontRef idx="minor">
+              <a:schemeClr val="lt1"/>
+            </a:fontRef>
+          </p:style>
+          <p:txBody>
+            <a:bodyPr rtlCol="0" anchor="ctr"/>
+            <a:lstStyle/>
+            <a:p>
+              <a:pPr algn="ctr"/>
+              <a:endParaRPr lang="en-US" dirty="0"/>
+            </a:p>
+          </p:txBody>
+        </p:sp>
+        <p:sp>
+          <p:nvSpPr>
+            <p:cNvPr id="18" name="TextBox 17">
+              <a:extLst>
+                <a:ext uri="{FF2B5EF4-FFF2-40B4-BE49-F238E27FC236}">
+                  <a16:creationId xmlns:a16="http://schemas.microsoft.com/office/drawing/2014/main" id="{BA1A7C94-66A6-5041-8ADC-565EEFF1A240}"/>
+                </a:ext>
+              </a:extLst>
+            </p:cNvPr>
+            <p:cNvSpPr txBox="1"/>
+            <p:nvPr/>
+          </p:nvSpPr>
+          <p:spPr>
+            <a:xfrm>
+              <a:off x="2937775" y="3875247"/>
+              <a:ext cx="2690120" cy="1710742"/>
+            </a:xfrm>
+            <a:prstGeom prst="rect">
+              <a:avLst/>
+            </a:prstGeom>
+            <a:noFill/>
+          </p:spPr>
+          <p:txBody>
+            <a:bodyPr wrap="square" rtlCol="0">
+              <a:spAutoFit/>
+            </a:bodyPr>
+            <a:lstStyle/>
+            <a:p>
+              <a:pPr marL="285750" indent="-285750">
+                <a:buFont typeface="Arial" panose="020B0604020202020204" pitchFamily="34" charset="0"/>
+                <a:buChar char="•"/>
+              </a:pPr>
+              <a:r>
+                <a:rPr lang="en-US" dirty="0">
+                  <a:solidFill>
+                    <a:schemeClr val="bg1"/>
+                  </a:solidFill>
+                </a:rPr>
+                <a:t>Obtain HPC friendly application </a:t>
+              </a:r>
+            </a:p>
+            <a:p>
+              <a:pPr marL="285750" indent="-285750">
+                <a:buFont typeface="Arial" panose="020B0604020202020204" pitchFamily="34" charset="0"/>
+                <a:buChar char="•"/>
+              </a:pPr>
+              <a:r>
+                <a:rPr lang="en-US" dirty="0">
+                  <a:solidFill>
+                    <a:schemeClr val="bg1"/>
+                  </a:solidFill>
+                </a:rPr>
+                <a:t>Create slurm job script</a:t>
+              </a:r>
+            </a:p>
+            <a:p>
+              <a:pPr marL="285750" indent="-285750">
+                <a:buFont typeface="Arial" panose="020B0604020202020204" pitchFamily="34" charset="0"/>
+                <a:buChar char="•"/>
+              </a:pPr>
+              <a:endParaRPr lang="en-US" dirty="0"/>
+            </a:p>
+          </p:txBody>
+        </p:sp>
+      </p:grpSp>
+      <p:grpSp>
+        <p:nvGrpSpPr>
+          <p:cNvPr id="20" name="Group 19">
+            <a:extLst>
+              <a:ext uri="{FF2B5EF4-FFF2-40B4-BE49-F238E27FC236}">
+                <a16:creationId xmlns:a16="http://schemas.microsoft.com/office/drawing/2014/main" id="{7F25C26B-CD69-DA4B-9BFB-846C0A944FDE}"/>
+              </a:ext>
+            </a:extLst>
+          </p:cNvPr>
+          <p:cNvGrpSpPr/>
+          <p:nvPr/>
+        </p:nvGrpSpPr>
+        <p:grpSpPr>
+          <a:xfrm>
+            <a:off x="6168280" y="3387187"/>
+            <a:ext cx="2126704" cy="1047649"/>
+            <a:chOff x="2851698" y="3827007"/>
+            <a:chExt cx="2874847" cy="1493138"/>
+          </a:xfrm>
+        </p:grpSpPr>
+        <p:sp>
+          <p:nvSpPr>
+            <p:cNvPr id="21" name="Rounded Rectangle 20">
+              <a:extLst>
+                <a:ext uri="{FF2B5EF4-FFF2-40B4-BE49-F238E27FC236}">
+                  <a16:creationId xmlns:a16="http://schemas.microsoft.com/office/drawing/2014/main" id="{3C5EDAC6-60D5-FE45-8610-EB952D451281}"/>
+                </a:ext>
+              </a:extLst>
+            </p:cNvPr>
+            <p:cNvSpPr/>
+            <p:nvPr/>
+          </p:nvSpPr>
+          <p:spPr>
+            <a:xfrm>
+              <a:off x="2851698" y="3827007"/>
+              <a:ext cx="2874847" cy="1493138"/>
+            </a:xfrm>
+            <a:prstGeom prst="roundRect">
+              <a:avLst/>
+            </a:prstGeom>
+          </p:spPr>
+          <p:style>
+            <a:lnRef idx="2">
+              <a:schemeClr val="accent1">
+                <a:shade val="50000"/>
+              </a:schemeClr>
+            </a:lnRef>
+            <a:fillRef idx="1">
+              <a:schemeClr val="accent1"/>
+            </a:fillRef>
+            <a:effectRef idx="0">
+              <a:schemeClr val="accent1"/>
+            </a:effectRef>
+            <a:fontRef idx="minor">
+              <a:schemeClr val="lt1"/>
+            </a:fontRef>
+          </p:style>
+          <p:txBody>
+            <a:bodyPr rtlCol="0" anchor="ctr"/>
+            <a:lstStyle/>
+            <a:p>
+              <a:pPr algn="ctr"/>
+              <a:endParaRPr lang="en-US" dirty="0"/>
+            </a:p>
+          </p:txBody>
+        </p:sp>
+        <p:sp>
+          <p:nvSpPr>
+            <p:cNvPr id="22" name="TextBox 21">
+              <a:extLst>
+                <a:ext uri="{FF2B5EF4-FFF2-40B4-BE49-F238E27FC236}">
+                  <a16:creationId xmlns:a16="http://schemas.microsoft.com/office/drawing/2014/main" id="{CE465E5F-CD06-D247-B948-5AAD2977DD99}"/>
+                </a:ext>
+              </a:extLst>
+            </p:cNvPr>
+            <p:cNvSpPr txBox="1"/>
+            <p:nvPr/>
+          </p:nvSpPr>
+          <p:spPr>
+            <a:xfrm>
+              <a:off x="2995947" y="4102957"/>
+              <a:ext cx="2690120" cy="923331"/>
+            </a:xfrm>
+            <a:prstGeom prst="rect">
+              <a:avLst/>
+            </a:prstGeom>
+            <a:noFill/>
+          </p:spPr>
+          <p:txBody>
+            <a:bodyPr wrap="square" rtlCol="0">
+              <a:spAutoFit/>
+            </a:bodyPr>
+            <a:lstStyle/>
+            <a:p>
+              <a:pPr marL="285750" indent="-285750">
+                <a:buFont typeface="Arial" panose="020B0604020202020204" pitchFamily="34" charset="0"/>
+                <a:buChar char="•"/>
+              </a:pPr>
+              <a:r>
+                <a:rPr lang="en-US" dirty="0">
+                  <a:solidFill>
+                    <a:schemeClr val="bg1"/>
+                  </a:solidFill>
+                </a:rPr>
+                <a:t>Compile code </a:t>
+              </a:r>
+            </a:p>
+            <a:p>
+              <a:pPr marL="285750" indent="-285750">
+                <a:buFont typeface="Arial" panose="020B0604020202020204" pitchFamily="34" charset="0"/>
+                <a:buChar char="•"/>
+              </a:pPr>
+              <a:r>
+                <a:rPr lang="en-US" dirty="0">
+                  <a:solidFill>
+                    <a:schemeClr val="bg1"/>
+                  </a:solidFill>
+                </a:rPr>
+                <a:t>Submit job</a:t>
+              </a:r>
+            </a:p>
+            <a:p>
+              <a:pPr marL="285750" indent="-285750">
+                <a:buFont typeface="Arial" panose="020B0604020202020204" pitchFamily="34" charset="0"/>
+                <a:buChar char="•"/>
+              </a:pPr>
+              <a:endParaRPr lang="en-US" dirty="0"/>
+            </a:p>
+          </p:txBody>
+        </p:sp>
+      </p:grpSp>
+      <p:grpSp>
+        <p:nvGrpSpPr>
+          <p:cNvPr id="23" name="Group 22">
+            <a:extLst>
+              <a:ext uri="{FF2B5EF4-FFF2-40B4-BE49-F238E27FC236}">
+                <a16:creationId xmlns:a16="http://schemas.microsoft.com/office/drawing/2014/main" id="{2B926044-BDBC-A94B-911E-AACCD3F6F160}"/>
+              </a:ext>
+            </a:extLst>
+          </p:cNvPr>
+          <p:cNvGrpSpPr/>
+          <p:nvPr/>
+        </p:nvGrpSpPr>
+        <p:grpSpPr>
+          <a:xfrm>
+            <a:off x="9043127" y="3395152"/>
+            <a:ext cx="2126704" cy="1047649"/>
+            <a:chOff x="2851698" y="3827007"/>
+            <a:chExt cx="2874847" cy="1493138"/>
+          </a:xfrm>
+        </p:grpSpPr>
+        <p:sp>
+          <p:nvSpPr>
+            <p:cNvPr id="24" name="Rounded Rectangle 23">
+              <a:extLst>
+                <a:ext uri="{FF2B5EF4-FFF2-40B4-BE49-F238E27FC236}">
+                  <a16:creationId xmlns:a16="http://schemas.microsoft.com/office/drawing/2014/main" id="{8C1034C6-22E7-5F4F-80FE-DF3A21E5A9EF}"/>
+                </a:ext>
+              </a:extLst>
+            </p:cNvPr>
+            <p:cNvSpPr/>
+            <p:nvPr/>
+          </p:nvSpPr>
+          <p:spPr>
+            <a:xfrm>
+              <a:off x="2851698" y="3827007"/>
+              <a:ext cx="2874847" cy="1493138"/>
+            </a:xfrm>
+            <a:prstGeom prst="roundRect">
+              <a:avLst/>
+            </a:prstGeom>
+          </p:spPr>
+          <p:style>
+            <a:lnRef idx="2">
+              <a:schemeClr val="accent1">
+                <a:shade val="50000"/>
+              </a:schemeClr>
+            </a:lnRef>
+            <a:fillRef idx="1">
+              <a:schemeClr val="accent1"/>
+            </a:fillRef>
+            <a:effectRef idx="0">
+              <a:schemeClr val="accent1"/>
+            </a:effectRef>
+            <a:fontRef idx="minor">
+              <a:schemeClr val="lt1"/>
+            </a:fontRef>
+          </p:style>
+          <p:txBody>
+            <a:bodyPr rtlCol="0" anchor="ctr"/>
+            <a:lstStyle/>
+            <a:p>
+              <a:pPr algn="ctr"/>
+              <a:endParaRPr lang="en-US" dirty="0"/>
+            </a:p>
+          </p:txBody>
+        </p:sp>
+        <p:sp>
+          <p:nvSpPr>
+            <p:cNvPr id="25" name="TextBox 24">
+              <a:extLst>
+                <a:ext uri="{FF2B5EF4-FFF2-40B4-BE49-F238E27FC236}">
+                  <a16:creationId xmlns:a16="http://schemas.microsoft.com/office/drawing/2014/main" id="{12BE49BC-8696-5F49-B07D-57E7F2B9CDFB}"/>
+                </a:ext>
+              </a:extLst>
+            </p:cNvPr>
+            <p:cNvSpPr txBox="1"/>
+            <p:nvPr/>
+          </p:nvSpPr>
+          <p:spPr>
+            <a:xfrm>
+              <a:off x="2985052" y="4064751"/>
+              <a:ext cx="2690120" cy="921169"/>
+            </a:xfrm>
+            <a:prstGeom prst="rect">
+              <a:avLst/>
+            </a:prstGeom>
+            <a:noFill/>
+          </p:spPr>
+          <p:txBody>
+            <a:bodyPr wrap="square" rtlCol="0">
+              <a:spAutoFit/>
+            </a:bodyPr>
+            <a:lstStyle/>
+            <a:p>
+              <a:pPr marL="285750" indent="-285750">
+                <a:buFont typeface="Arial" panose="020B0604020202020204" pitchFamily="34" charset="0"/>
+                <a:buChar char="•"/>
+              </a:pPr>
+              <a:r>
+                <a:rPr lang="en-US" dirty="0">
+                  <a:solidFill>
+                    <a:schemeClr val="bg1"/>
+                  </a:solidFill>
+                </a:rPr>
+                <a:t>Monitor jobs</a:t>
+              </a:r>
+            </a:p>
+            <a:p>
+              <a:pPr marL="285750" indent="-285750">
+                <a:buFont typeface="Arial" panose="020B0604020202020204" pitchFamily="34" charset="0"/>
+                <a:buChar char="•"/>
+              </a:pPr>
+              <a:r>
+                <a:rPr lang="en-US" dirty="0">
+                  <a:solidFill>
+                    <a:schemeClr val="bg1"/>
+                  </a:solidFill>
+                </a:rPr>
+                <a:t>Obtain output</a:t>
+              </a:r>
+            </a:p>
+          </p:txBody>
+        </p:sp>
+      </p:grpSp>
+      <p:cxnSp>
+        <p:nvCxnSpPr>
+          <p:cNvPr id="27" name="Straight Arrow Connector 26">
+            <a:extLst>
+              <a:ext uri="{FF2B5EF4-FFF2-40B4-BE49-F238E27FC236}">
+                <a16:creationId xmlns:a16="http://schemas.microsoft.com/office/drawing/2014/main" id="{8970F387-9F73-B440-87D5-04DA6925AAA5}"/>
+              </a:ext>
+            </a:extLst>
+          </p:cNvPr>
+          <p:cNvCxnSpPr>
+            <a:cxnSpLocks/>
+            <a:stCxn id="14" idx="3"/>
+            <a:endCxn id="15" idx="1"/>
+          </p:cNvCxnSpPr>
+          <p:nvPr/>
+        </p:nvCxnSpPr>
+        <p:spPr>
+          <a:xfrm flipV="1">
+            <a:off x="1801980" y="3911012"/>
+            <a:ext cx="746532" cy="1682"/>
+          </a:xfrm>
+          <a:prstGeom prst="straightConnector1">
+            <a:avLst/>
+          </a:prstGeom>
+          <a:ln w="25400">
+            <a:solidFill>
+              <a:schemeClr val="tx1"/>
+            </a:solidFill>
+            <a:tailEnd type="triangle"/>
+          </a:ln>
+        </p:spPr>
+        <p:style>
+          <a:lnRef idx="1">
+            <a:schemeClr val="accent1"/>
+          </a:lnRef>
+          <a:fillRef idx="0">
+            <a:schemeClr val="accent1"/>
+          </a:fillRef>
+          <a:effectRef idx="0">
+            <a:schemeClr val="accent1"/>
+          </a:effectRef>
+          <a:fontRef idx="minor">
+            <a:schemeClr val="tx1"/>
+          </a:fontRef>
+        </p:style>
+      </p:cxnSp>
+      <p:cxnSp>
+        <p:nvCxnSpPr>
+          <p:cNvPr id="29" name="Straight Arrow Connector 28">
+            <a:extLst>
+              <a:ext uri="{FF2B5EF4-FFF2-40B4-BE49-F238E27FC236}">
+                <a16:creationId xmlns:a16="http://schemas.microsoft.com/office/drawing/2014/main" id="{0C62BD49-DCE5-9F43-9B9B-C568413113F7}"/>
+              </a:ext>
+            </a:extLst>
+          </p:cNvPr>
+          <p:cNvCxnSpPr>
+            <a:cxnSpLocks/>
+            <a:stCxn id="15" idx="3"/>
+            <a:endCxn id="21" idx="1"/>
+          </p:cNvCxnSpPr>
+          <p:nvPr/>
+        </p:nvCxnSpPr>
+        <p:spPr>
+          <a:xfrm>
+            <a:off x="5423359" y="3911012"/>
+            <a:ext cx="744921" cy="0"/>
+          </a:xfrm>
+          <a:prstGeom prst="straightConnector1">
+            <a:avLst/>
+          </a:prstGeom>
+          <a:ln w="25400">
+            <a:solidFill>
+              <a:schemeClr val="tx1"/>
+            </a:solidFill>
+            <a:tailEnd type="triangle"/>
+          </a:ln>
+        </p:spPr>
+        <p:style>
+          <a:lnRef idx="1">
+            <a:schemeClr val="accent1"/>
+          </a:lnRef>
+          <a:fillRef idx="0">
+            <a:schemeClr val="accent1"/>
+          </a:fillRef>
+          <a:effectRef idx="0">
+            <a:schemeClr val="accent1"/>
+          </a:effectRef>
+          <a:fontRef idx="minor">
+            <a:schemeClr val="tx1"/>
+          </a:fontRef>
+        </p:style>
+      </p:cxnSp>
+      <p:cxnSp>
+        <p:nvCxnSpPr>
+          <p:cNvPr id="32" name="Straight Arrow Connector 31">
+            <a:extLst>
+              <a:ext uri="{FF2B5EF4-FFF2-40B4-BE49-F238E27FC236}">
+                <a16:creationId xmlns:a16="http://schemas.microsoft.com/office/drawing/2014/main" id="{F9F1631E-6962-5E46-999B-EDD94FCB2268}"/>
+              </a:ext>
+            </a:extLst>
+          </p:cNvPr>
+          <p:cNvCxnSpPr>
+            <a:cxnSpLocks/>
+            <a:stCxn id="21" idx="3"/>
+            <a:endCxn id="24" idx="1"/>
+          </p:cNvCxnSpPr>
+          <p:nvPr/>
+        </p:nvCxnSpPr>
+        <p:spPr>
+          <a:xfrm>
+            <a:off x="8294984" y="3911012"/>
+            <a:ext cx="748143" cy="7965"/>
+          </a:xfrm>
+          <a:prstGeom prst="straightConnector1">
+            <a:avLst/>
+          </a:prstGeom>
+          <a:ln w="25400">
+            <a:solidFill>
+              <a:schemeClr val="tx1"/>
+            </a:solidFill>
+            <a:tailEnd type="triangle"/>
+          </a:ln>
+        </p:spPr>
+        <p:style>
+          <a:lnRef idx="1">
+            <a:schemeClr val="accent1"/>
+          </a:lnRef>
+          <a:fillRef idx="0">
+            <a:schemeClr val="accent1"/>
+          </a:fillRef>
+          <a:effectRef idx="0">
+            <a:schemeClr val="accent1"/>
+          </a:effectRef>
+          <a:fontRef idx="minor">
+            <a:schemeClr val="tx1"/>
+          </a:fontRef>
+        </p:style>
+      </p:cxnSp>
     </p:spTree>
     <p:extLst>
       <p:ext uri="{BB962C8B-B14F-4D97-AF65-F5344CB8AC3E}">
@@ -7497,41 +7569,71 @@
             <p:ph idx="1"/>
           </p:nvPr>
         </p:nvSpPr>
-        <p:spPr/>
-        <p:txBody>
-          <a:bodyPr/>
+        <p:spPr>
+          <a:xfrm>
+            <a:off x="1061483" y="2884325"/>
+            <a:ext cx="3824553" cy="1669201"/>
+          </a:xfrm>
+        </p:spPr>
+        <p:txBody>
+          <a:bodyPr>
+            <a:normAutofit/>
+          </a:bodyPr>
           <a:lstStyle/>
           <a:p>
             <a:r>
-              <a:rPr lang="en-US" dirty="0"/>
+              <a:rPr lang="en-US" sz="2400" dirty="0"/>
               <a:t>Documentation</a:t>
             </a:r>
           </a:p>
           <a:p>
             <a:pPr lvl="1"/>
             <a:r>
-              <a:rPr lang="en-US" dirty="0">
+              <a:rPr lang="en-US" sz="2400" dirty="0">
                 <a:hlinkClick r:id="rId2"/>
               </a:rPr>
-              <a:t>https://curc.readthedocs.io/en/latest/index.html</a:t>
-            </a:r>
-            <a:endParaRPr lang="en-US" dirty="0"/>
-          </a:p>
-          <a:p>
-            <a:pPr lvl="1"/>
-            <a:r>
-              <a:rPr lang="en-US" dirty="0"/>
-              <a:t>Put picture of documentation</a:t>
-            </a:r>
-          </a:p>
-          <a:p>
-            <a:r>
-              <a:rPr lang="en-US" dirty="0"/>
+              <a:t>curc.readthedocs.io</a:t>
+            </a:r>
+            <a:endParaRPr lang="en-US" sz="2400" dirty="0"/>
+          </a:p>
+          <a:p>
+            <a:r>
+              <a:rPr lang="en-US" sz="2400" dirty="0"/>
               <a:t>rc-help@colorado.edu</a:t>
             </a:r>
           </a:p>
         </p:txBody>
       </p:sp>
+      <p:pic>
+        <p:nvPicPr>
+          <p:cNvPr id="7" name="Picture 6">
+            <a:extLst>
+              <a:ext uri="{FF2B5EF4-FFF2-40B4-BE49-F238E27FC236}">
+                <a16:creationId xmlns:a16="http://schemas.microsoft.com/office/drawing/2014/main" id="{BF3C0312-88DF-5C47-A238-73C8373EB000}"/>
+              </a:ext>
+            </a:extLst>
+          </p:cNvPr>
+          <p:cNvPicPr>
+            <a:picLocks noChangeAspect="1"/>
+          </p:cNvPicPr>
+          <p:nvPr/>
+        </p:nvPicPr>
+        <p:blipFill>
+          <a:blip r:embed="rId3"/>
+          <a:stretch>
+            <a:fillRect/>
+          </a:stretch>
+        </p:blipFill>
+        <p:spPr>
+          <a:xfrm>
+            <a:off x="5884597" y="1908117"/>
+            <a:ext cx="5494603" cy="4745122"/>
+          </a:xfrm>
+          <a:prstGeom prst="rect">
+            <a:avLst/>
+          </a:prstGeom>
+        </p:spPr>
+      </p:pic>
     </p:spTree>
     <p:extLst>
       <p:ext uri="{BB962C8B-B14F-4D97-AF65-F5344CB8AC3E}">
@@ -7689,7 +7791,7 @@
             </a:r>
             <a:r>
               <a:rPr lang="en-US" sz="2600" dirty="0"/>
-              <a:t> Obtain a clear overview of a simple common workflow on an HPC system</a:t>
+              <a:t> Obtain a clear overview of a common workflow on an HPC system</a:t>
             </a:r>
           </a:p>
           <a:p>
@@ -10379,7 +10481,7 @@
             <a:lstStyle/>
             <a:p>
               <a:pPr algn="ctr"/>
-              <a:endParaRPr lang="en-US"/>
+              <a:endParaRPr lang="en-US" dirty="0"/>
             </a:p>
           </p:txBody>
         </p:sp>
@@ -10433,7 +10535,7 @@
             <a:lstStyle/>
             <a:p>
               <a:pPr algn="ctr"/>
-              <a:endParaRPr lang="en-US"/>
+              <a:endParaRPr lang="en-US" dirty="0"/>
             </a:p>
           </p:txBody>
         </p:sp>
@@ -10526,7 +10628,7 @@
             <a:lstStyle/>
             <a:p>
               <a:pPr algn="ctr"/>
-              <a:endParaRPr lang="en-US"/>
+              <a:endParaRPr lang="en-US" dirty="0"/>
             </a:p>
           </p:txBody>
         </p:sp>
@@ -11137,10 +11239,9 @@
           <a:lstStyle/>
           <a:p>
             <a:r>
-              <a:rPr lang="en-US"/>
+              <a:rPr lang="en-US" dirty="0"/>
               <a:t>rc-help@colorado.edu</a:t>
             </a:r>
-            <a:endParaRPr lang="en-US" dirty="0"/>
           </a:p>
         </p:txBody>
       </p:sp>
@@ -11211,7 +11312,7 @@
             <a:lstStyle/>
             <a:p>
               <a:pPr algn="ctr"/>
-              <a:endParaRPr lang="en-US"/>
+              <a:endParaRPr lang="en-US" dirty="0"/>
             </a:p>
           </p:txBody>
         </p:sp>
@@ -11377,7 +11478,7 @@
           <a:lstStyle/>
           <a:p>
             <a:pPr algn="ctr"/>
-            <a:endParaRPr lang="en-US"/>
+            <a:endParaRPr lang="en-US" dirty="0"/>
           </a:p>
         </p:txBody>
       </p:sp>
@@ -11462,7 +11563,7 @@
           <a:lstStyle/>
           <a:p>
             <a:pPr algn="ctr"/>
-            <a:endParaRPr lang="en-US"/>
+            <a:endParaRPr lang="en-US" dirty="0"/>
           </a:p>
         </p:txBody>
       </p:sp>

</xml_diff>